<commit_message>
changed class 2 added scripts
</commit_message>
<xml_diff>
--- a/Class_2.0.pptx
+++ b/Class_2.0.pptx
@@ -5,50 +5,54 @@
     <p:sldMasterId id="2147483660" r:id="rId1"/>
   </p:sldMasterIdLst>
   <p:notesMasterIdLst>
-    <p:notesMasterId r:id="rId35"/>
+    <p:notesMasterId r:id="rId39"/>
   </p:notesMasterIdLst>
   <p:handoutMasterIdLst>
-    <p:handoutMasterId r:id="rId36"/>
+    <p:handoutMasterId r:id="rId40"/>
   </p:handoutMasterIdLst>
   <p:sldIdLst>
     <p:sldId id="264" r:id="rId2"/>
     <p:sldId id="634" r:id="rId3"/>
-    <p:sldId id="635" r:id="rId4"/>
-    <p:sldId id="607" r:id="rId5"/>
-    <p:sldId id="609" r:id="rId6"/>
-    <p:sldId id="610" r:id="rId7"/>
-    <p:sldId id="611" r:id="rId8"/>
-    <p:sldId id="612" r:id="rId9"/>
-    <p:sldId id="613" r:id="rId10"/>
-    <p:sldId id="636" r:id="rId11"/>
-    <p:sldId id="639" r:id="rId12"/>
-    <p:sldId id="642" r:id="rId13"/>
-    <p:sldId id="643" r:id="rId14"/>
-    <p:sldId id="644" r:id="rId15"/>
-    <p:sldId id="640" r:id="rId16"/>
-    <p:sldId id="641" r:id="rId17"/>
-    <p:sldId id="645" r:id="rId18"/>
-    <p:sldId id="646" r:id="rId19"/>
-    <p:sldId id="637" r:id="rId20"/>
-    <p:sldId id="649" r:id="rId21"/>
-    <p:sldId id="650" r:id="rId22"/>
-    <p:sldId id="651" r:id="rId23"/>
-    <p:sldId id="652" r:id="rId24"/>
-    <p:sldId id="653" r:id="rId25"/>
-    <p:sldId id="654" r:id="rId26"/>
-    <p:sldId id="655" r:id="rId27"/>
-    <p:sldId id="656" r:id="rId28"/>
-    <p:sldId id="638" r:id="rId29"/>
-    <p:sldId id="625" r:id="rId30"/>
-    <p:sldId id="626" r:id="rId31"/>
-    <p:sldId id="627" r:id="rId32"/>
-    <p:sldId id="628" r:id="rId33"/>
-    <p:sldId id="648" r:id="rId34"/>
+    <p:sldId id="657" r:id="rId4"/>
+    <p:sldId id="635" r:id="rId5"/>
+    <p:sldId id="607" r:id="rId6"/>
+    <p:sldId id="609" r:id="rId7"/>
+    <p:sldId id="610" r:id="rId8"/>
+    <p:sldId id="611" r:id="rId9"/>
+    <p:sldId id="612" r:id="rId10"/>
+    <p:sldId id="613" r:id="rId11"/>
+    <p:sldId id="636" r:id="rId12"/>
+    <p:sldId id="639" r:id="rId13"/>
+    <p:sldId id="642" r:id="rId14"/>
+    <p:sldId id="643" r:id="rId15"/>
+    <p:sldId id="644" r:id="rId16"/>
+    <p:sldId id="640" r:id="rId17"/>
+    <p:sldId id="641" r:id="rId18"/>
+    <p:sldId id="645" r:id="rId19"/>
+    <p:sldId id="646" r:id="rId20"/>
+    <p:sldId id="658" r:id="rId21"/>
+    <p:sldId id="659" r:id="rId22"/>
+    <p:sldId id="660" r:id="rId23"/>
+    <p:sldId id="637" r:id="rId24"/>
+    <p:sldId id="649" r:id="rId25"/>
+    <p:sldId id="650" r:id="rId26"/>
+    <p:sldId id="651" r:id="rId27"/>
+    <p:sldId id="652" r:id="rId28"/>
+    <p:sldId id="653" r:id="rId29"/>
+    <p:sldId id="654" r:id="rId30"/>
+    <p:sldId id="655" r:id="rId31"/>
+    <p:sldId id="656" r:id="rId32"/>
+    <p:sldId id="638" r:id="rId33"/>
+    <p:sldId id="625" r:id="rId34"/>
+    <p:sldId id="626" r:id="rId35"/>
+    <p:sldId id="627" r:id="rId36"/>
+    <p:sldId id="628" r:id="rId37"/>
+    <p:sldId id="648" r:id="rId38"/>
   </p:sldIdLst>
   <p:sldSz cx="9906000" cy="6858000" type="A4"/>
   <p:notesSz cx="6858000" cy="9144000"/>
   <p:custDataLst>
-    <p:tags r:id="rId37"/>
+    <p:tags r:id="rId41"/>
   </p:custDataLst>
   <p:defaultTextStyle>
     <a:defPPr>
@@ -1228,6 +1232,265 @@
 </p:notes>
 </file>
 
+<file path=ppt/notesSlides/notesSlide10.xml><?xml version="1.0" encoding="utf-8"?>
+<p:notes xmlns:a="http://schemas.openxmlformats.org/drawingml/2006/main" xmlns:r="http://schemas.openxmlformats.org/officeDocument/2006/relationships" xmlns:p="http://schemas.openxmlformats.org/presentationml/2006/main">
+  <p:cSld>
+    <p:spTree>
+      <p:nvGrpSpPr>
+        <p:cNvPr id="1" name=""/>
+        <p:cNvGrpSpPr/>
+        <p:nvPr/>
+      </p:nvGrpSpPr>
+      <p:grpSpPr>
+        <a:xfrm>
+          <a:off x="0" y="0"/>
+          <a:ext cx="0" cy="0"/>
+          <a:chOff x="0" y="0"/>
+          <a:chExt cx="0" cy="0"/>
+        </a:xfrm>
+      </p:grpSpPr>
+      <p:sp>
+        <p:nvSpPr>
+          <p:cNvPr id="2" name="Slide Image Placeholder 1"/>
+          <p:cNvSpPr>
+            <a:spLocks noGrp="1" noRot="1" noChangeAspect="1"/>
+          </p:cNvSpPr>
+          <p:nvPr>
+            <p:ph type="sldImg"/>
+          </p:nvPr>
+        </p:nvSpPr>
+        <p:spPr/>
+      </p:sp>
+      <p:sp>
+        <p:nvSpPr>
+          <p:cNvPr id="3" name="Notes Placeholder 2"/>
+          <p:cNvSpPr>
+            <a:spLocks noGrp="1"/>
+          </p:cNvSpPr>
+          <p:nvPr>
+            <p:ph type="body" idx="1"/>
+          </p:nvPr>
+        </p:nvSpPr>
+        <p:spPr/>
+        <p:txBody>
+          <a:bodyPr/>
+          <a:lstStyle/>
+          <a:p>
+            <a:endParaRPr lang="en-US" dirty="0"/>
+          </a:p>
+        </p:txBody>
+      </p:sp>
+      <p:sp>
+        <p:nvSpPr>
+          <p:cNvPr id="4" name="Slide Number Placeholder 3"/>
+          <p:cNvSpPr>
+            <a:spLocks noGrp="1"/>
+          </p:cNvSpPr>
+          <p:nvPr>
+            <p:ph type="sldNum" sz="quarter" idx="10"/>
+          </p:nvPr>
+        </p:nvSpPr>
+        <p:spPr/>
+        <p:txBody>
+          <a:bodyPr/>
+          <a:lstStyle/>
+          <a:p>
+            <a:fld id="{E2E13D21-0B26-4117-89F3-87EE82AAEDBB}" type="slidenum">
+              <a:rPr lang="ja-JP" altLang="en-US" smtClean="0"/>
+              <a:pPr/>
+              <a:t>31</a:t>
+            </a:fld>
+            <a:endParaRPr lang="en-US" altLang="ja-JP"/>
+          </a:p>
+        </p:txBody>
+      </p:sp>
+    </p:spTree>
+    <p:extLst>
+      <p:ext uri="{BB962C8B-B14F-4D97-AF65-F5344CB8AC3E}">
+        <p14:creationId xmlns:p14="http://schemas.microsoft.com/office/powerpoint/2010/main" val="564434053"/>
+      </p:ext>
+    </p:extLst>
+  </p:cSld>
+  <p:clrMapOvr>
+    <a:masterClrMapping/>
+  </p:clrMapOvr>
+</p:notes>
+</file>
+
+<file path=ppt/notesSlides/notesSlide11.xml><?xml version="1.0" encoding="utf-8"?>
+<p:notes xmlns:a="http://schemas.openxmlformats.org/drawingml/2006/main" xmlns:r="http://schemas.openxmlformats.org/officeDocument/2006/relationships" xmlns:p="http://schemas.openxmlformats.org/presentationml/2006/main">
+  <p:cSld>
+    <p:spTree>
+      <p:nvGrpSpPr>
+        <p:cNvPr id="1" name=""/>
+        <p:cNvGrpSpPr/>
+        <p:nvPr/>
+      </p:nvGrpSpPr>
+      <p:grpSpPr>
+        <a:xfrm>
+          <a:off x="0" y="0"/>
+          <a:ext cx="0" cy="0"/>
+          <a:chOff x="0" y="0"/>
+          <a:chExt cx="0" cy="0"/>
+        </a:xfrm>
+      </p:grpSpPr>
+      <p:sp>
+        <p:nvSpPr>
+          <p:cNvPr id="2" name="Slide Image Placeholder 1"/>
+          <p:cNvSpPr>
+            <a:spLocks noGrp="1" noRot="1" noChangeAspect="1"/>
+          </p:cNvSpPr>
+          <p:nvPr>
+            <p:ph type="sldImg"/>
+          </p:nvPr>
+        </p:nvSpPr>
+        <p:spPr/>
+      </p:sp>
+      <p:sp>
+        <p:nvSpPr>
+          <p:cNvPr id="3" name="Notes Placeholder 2"/>
+          <p:cNvSpPr>
+            <a:spLocks noGrp="1"/>
+          </p:cNvSpPr>
+          <p:nvPr>
+            <p:ph type="body" idx="1"/>
+          </p:nvPr>
+        </p:nvSpPr>
+        <p:spPr/>
+        <p:txBody>
+          <a:bodyPr/>
+          <a:lstStyle/>
+          <a:p>
+            <a:endParaRPr lang="en-US" dirty="0"/>
+          </a:p>
+        </p:txBody>
+      </p:sp>
+      <p:sp>
+        <p:nvSpPr>
+          <p:cNvPr id="4" name="Slide Number Placeholder 3"/>
+          <p:cNvSpPr>
+            <a:spLocks noGrp="1"/>
+          </p:cNvSpPr>
+          <p:nvPr>
+            <p:ph type="sldNum" sz="quarter" idx="10"/>
+          </p:nvPr>
+        </p:nvSpPr>
+        <p:spPr/>
+        <p:txBody>
+          <a:bodyPr/>
+          <a:lstStyle/>
+          <a:p>
+            <a:fld id="{E2E13D21-0B26-4117-89F3-87EE82AAEDBB}" type="slidenum">
+              <a:rPr lang="ja-JP" altLang="en-US" smtClean="0"/>
+              <a:pPr/>
+              <a:t>32</a:t>
+            </a:fld>
+            <a:endParaRPr lang="en-US" altLang="ja-JP"/>
+          </a:p>
+        </p:txBody>
+      </p:sp>
+    </p:spTree>
+    <p:extLst>
+      <p:ext uri="{BB962C8B-B14F-4D97-AF65-F5344CB8AC3E}">
+        <p14:creationId xmlns:p14="http://schemas.microsoft.com/office/powerpoint/2010/main" val="1109707960"/>
+      </p:ext>
+    </p:extLst>
+  </p:cSld>
+  <p:clrMapOvr>
+    <a:masterClrMapping/>
+  </p:clrMapOvr>
+</p:notes>
+</file>
+
+<file path=ppt/notesSlides/notesSlide12.xml><?xml version="1.0" encoding="utf-8"?>
+<p:notes xmlns:a="http://schemas.openxmlformats.org/drawingml/2006/main" xmlns:r="http://schemas.openxmlformats.org/officeDocument/2006/relationships" xmlns:p="http://schemas.openxmlformats.org/presentationml/2006/main">
+  <p:cSld>
+    <p:spTree>
+      <p:nvGrpSpPr>
+        <p:cNvPr id="1" name=""/>
+        <p:cNvGrpSpPr/>
+        <p:nvPr/>
+      </p:nvGrpSpPr>
+      <p:grpSpPr>
+        <a:xfrm>
+          <a:off x="0" y="0"/>
+          <a:ext cx="0" cy="0"/>
+          <a:chOff x="0" y="0"/>
+          <a:chExt cx="0" cy="0"/>
+        </a:xfrm>
+      </p:grpSpPr>
+      <p:sp>
+        <p:nvSpPr>
+          <p:cNvPr id="7" name="Rectangle 7"/>
+          <p:cNvSpPr>
+            <a:spLocks noGrp="1" noChangeArrowheads="1"/>
+          </p:cNvSpPr>
+          <p:nvPr>
+            <p:ph type="sldNum" sz="quarter" idx="5"/>
+          </p:nvPr>
+        </p:nvSpPr>
+        <p:spPr>
+          <a:ln/>
+        </p:spPr>
+        <p:txBody>
+          <a:bodyPr/>
+          <a:lstStyle/>
+          <a:p>
+            <a:fld id="{A28FB05A-BEFB-48FA-8140-0AB5CD9C2061}" type="slidenum">
+              <a:rPr lang="ja-JP" altLang="en-US"/>
+              <a:pPr/>
+              <a:t>37</a:t>
+            </a:fld>
+            <a:endParaRPr lang="en-US" altLang="ja-JP"/>
+          </a:p>
+        </p:txBody>
+      </p:sp>
+      <p:sp>
+        <p:nvSpPr>
+          <p:cNvPr id="38914" name="Rectangle 2"/>
+          <p:cNvSpPr>
+            <a:spLocks noGrp="1" noRot="1" noChangeAspect="1" noChangeArrowheads="1" noTextEdit="1"/>
+          </p:cNvSpPr>
+          <p:nvPr>
+            <p:ph type="sldImg"/>
+          </p:nvPr>
+        </p:nvSpPr>
+        <p:spPr>
+          <a:ln/>
+        </p:spPr>
+      </p:sp>
+      <p:sp>
+        <p:nvSpPr>
+          <p:cNvPr id="38915" name="Rectangle 3"/>
+          <p:cNvSpPr>
+            <a:spLocks noGrp="1" noChangeArrowheads="1"/>
+          </p:cNvSpPr>
+          <p:nvPr>
+            <p:ph type="body" idx="1"/>
+          </p:nvPr>
+        </p:nvSpPr>
+        <p:spPr/>
+        <p:txBody>
+          <a:bodyPr/>
+          <a:lstStyle/>
+          <a:p>
+            <a:endParaRPr lang="ja-JP" altLang="en-US" dirty="0"/>
+          </a:p>
+        </p:txBody>
+      </p:sp>
+    </p:spTree>
+    <p:extLst>
+      <p:ext uri="{BB962C8B-B14F-4D97-AF65-F5344CB8AC3E}">
+        <p14:creationId xmlns:p14="http://schemas.microsoft.com/office/powerpoint/2010/main" val="1621301740"/>
+      </p:ext>
+    </p:extLst>
+  </p:cSld>
+  <p:clrMapOvr>
+    <a:masterClrMapping/>
+  </p:clrMapOvr>
+</p:notes>
+</file>
+
 <file path=ppt/notesSlides/notesSlide2.xml><?xml version="1.0" encoding="utf-8"?>
 <p:notes xmlns:a="http://schemas.openxmlformats.org/drawingml/2006/main" xmlns:r="http://schemas.openxmlformats.org/officeDocument/2006/relationships" xmlns:p="http://schemas.openxmlformats.org/presentationml/2006/main">
   <p:cSld>
@@ -1379,7 +1642,7 @@
             <a:fld id="{E2E13D21-0B26-4117-89F3-87EE82AAEDBB}" type="slidenum">
               <a:rPr lang="ja-JP" altLang="en-US" smtClean="0"/>
               <a:pPr/>
-              <a:t>3</a:t>
+              <a:t>4</a:t>
             </a:fld>
             <a:endParaRPr lang="en-US" altLang="ja-JP"/>
           </a:p>
@@ -1464,7 +1727,7 @@
             <a:fld id="{E2E13D21-0B26-4117-89F3-87EE82AAEDBB}" type="slidenum">
               <a:rPr lang="ja-JP" altLang="en-US" smtClean="0"/>
               <a:pPr/>
-              <a:t>10</a:t>
+              <a:t>5</a:t>
             </a:fld>
             <a:endParaRPr lang="en-US" altLang="ja-JP"/>
           </a:p>
@@ -1473,7 +1736,7 @@
     </p:spTree>
     <p:extLst>
       <p:ext uri="{BB962C8B-B14F-4D97-AF65-F5344CB8AC3E}">
-        <p14:creationId xmlns:p14="http://schemas.microsoft.com/office/powerpoint/2010/main" val="1305869033"/>
+        <p14:creationId xmlns:p14="http://schemas.microsoft.com/office/powerpoint/2010/main" val="1424602536"/>
       </p:ext>
     </p:extLst>
   </p:cSld>
@@ -1549,7 +1812,7 @@
             <a:fld id="{E2E13D21-0B26-4117-89F3-87EE82AAEDBB}" type="slidenum">
               <a:rPr lang="ja-JP" altLang="en-US" smtClean="0"/>
               <a:pPr/>
-              <a:t>19</a:t>
+              <a:t>11</a:t>
             </a:fld>
             <a:endParaRPr lang="en-US" altLang="ja-JP"/>
           </a:p>
@@ -1558,7 +1821,7 @@
     </p:spTree>
     <p:extLst>
       <p:ext uri="{BB962C8B-B14F-4D97-AF65-F5344CB8AC3E}">
-        <p14:creationId xmlns:p14="http://schemas.microsoft.com/office/powerpoint/2010/main" val="1968663036"/>
+        <p14:creationId xmlns:p14="http://schemas.microsoft.com/office/powerpoint/2010/main" val="1305869033"/>
       </p:ext>
     </p:extLst>
   </p:cSld>
@@ -1634,7 +1897,7 @@
             <a:fld id="{E2E13D21-0B26-4117-89F3-87EE82AAEDBB}" type="slidenum">
               <a:rPr lang="ja-JP" altLang="en-US" smtClean="0"/>
               <a:pPr/>
-              <a:t>25</a:t>
+              <a:t>21</a:t>
             </a:fld>
             <a:endParaRPr lang="en-US" altLang="ja-JP"/>
           </a:p>
@@ -1643,7 +1906,7 @@
     </p:spTree>
     <p:extLst>
       <p:ext uri="{BB962C8B-B14F-4D97-AF65-F5344CB8AC3E}">
-        <p14:creationId xmlns:p14="http://schemas.microsoft.com/office/powerpoint/2010/main" val="51090003"/>
+        <p14:creationId xmlns:p14="http://schemas.microsoft.com/office/powerpoint/2010/main" val="479455001"/>
       </p:ext>
     </p:extLst>
   </p:cSld>
@@ -1719,7 +1982,7 @@
             <a:fld id="{E2E13D21-0B26-4117-89F3-87EE82AAEDBB}" type="slidenum">
               <a:rPr lang="ja-JP" altLang="en-US" smtClean="0"/>
               <a:pPr/>
-              <a:t>27</a:t>
+              <a:t>22</a:t>
             </a:fld>
             <a:endParaRPr lang="en-US" altLang="ja-JP"/>
           </a:p>
@@ -1728,7 +1991,7 @@
     </p:spTree>
     <p:extLst>
       <p:ext uri="{BB962C8B-B14F-4D97-AF65-F5344CB8AC3E}">
-        <p14:creationId xmlns:p14="http://schemas.microsoft.com/office/powerpoint/2010/main" val="564434053"/>
+        <p14:creationId xmlns:p14="http://schemas.microsoft.com/office/powerpoint/2010/main" val="841558263"/>
       </p:ext>
     </p:extLst>
   </p:cSld>
@@ -1804,7 +2067,7 @@
             <a:fld id="{E2E13D21-0B26-4117-89F3-87EE82AAEDBB}" type="slidenum">
               <a:rPr lang="ja-JP" altLang="en-US" smtClean="0"/>
               <a:pPr/>
-              <a:t>28</a:t>
+              <a:t>23</a:t>
             </a:fld>
             <a:endParaRPr lang="en-US" altLang="ja-JP"/>
           </a:p>
@@ -1813,7 +2076,7 @@
     </p:spTree>
     <p:extLst>
       <p:ext uri="{BB962C8B-B14F-4D97-AF65-F5344CB8AC3E}">
-        <p14:creationId xmlns:p14="http://schemas.microsoft.com/office/powerpoint/2010/main" val="1109707960"/>
+        <p14:creationId xmlns:p14="http://schemas.microsoft.com/office/powerpoint/2010/main" val="1968663036"/>
       </p:ext>
     </p:extLst>
   </p:cSld>
@@ -1842,67 +2105,63 @@
       </p:grpSpPr>
       <p:sp>
         <p:nvSpPr>
-          <p:cNvPr id="7" name="Rectangle 7"/>
-          <p:cNvSpPr>
-            <a:spLocks noGrp="1" noChangeArrowheads="1"/>
-          </p:cNvSpPr>
-          <p:nvPr>
-            <p:ph type="sldNum" sz="quarter" idx="5"/>
-          </p:nvPr>
-        </p:nvSpPr>
-        <p:spPr>
-          <a:ln/>
-        </p:spPr>
+          <p:cNvPr id="2" name="Slide Image Placeholder 1"/>
+          <p:cNvSpPr>
+            <a:spLocks noGrp="1" noRot="1" noChangeAspect="1"/>
+          </p:cNvSpPr>
+          <p:nvPr>
+            <p:ph type="sldImg"/>
+          </p:nvPr>
+        </p:nvSpPr>
+        <p:spPr/>
+      </p:sp>
+      <p:sp>
+        <p:nvSpPr>
+          <p:cNvPr id="3" name="Notes Placeholder 2"/>
+          <p:cNvSpPr>
+            <a:spLocks noGrp="1"/>
+          </p:cNvSpPr>
+          <p:nvPr>
+            <p:ph type="body" idx="1"/>
+          </p:nvPr>
+        </p:nvSpPr>
+        <p:spPr/>
         <p:txBody>
           <a:bodyPr/>
           <a:lstStyle/>
           <a:p>
-            <a:fld id="{A28FB05A-BEFB-48FA-8140-0AB5CD9C2061}" type="slidenum">
-              <a:rPr lang="ja-JP" altLang="en-US"/>
+            <a:endParaRPr lang="en-US" dirty="0"/>
+          </a:p>
+        </p:txBody>
+      </p:sp>
+      <p:sp>
+        <p:nvSpPr>
+          <p:cNvPr id="4" name="Slide Number Placeholder 3"/>
+          <p:cNvSpPr>
+            <a:spLocks noGrp="1"/>
+          </p:cNvSpPr>
+          <p:nvPr>
+            <p:ph type="sldNum" sz="quarter" idx="10"/>
+          </p:nvPr>
+        </p:nvSpPr>
+        <p:spPr/>
+        <p:txBody>
+          <a:bodyPr/>
+          <a:lstStyle/>
+          <a:p>
+            <a:fld id="{E2E13D21-0B26-4117-89F3-87EE82AAEDBB}" type="slidenum">
+              <a:rPr lang="ja-JP" altLang="en-US" smtClean="0"/>
               <a:pPr/>
-              <a:t>33</a:t>
+              <a:t>29</a:t>
             </a:fld>
             <a:endParaRPr lang="en-US" altLang="ja-JP"/>
-          </a:p>
-        </p:txBody>
-      </p:sp>
-      <p:sp>
-        <p:nvSpPr>
-          <p:cNvPr id="38914" name="Rectangle 2"/>
-          <p:cNvSpPr>
-            <a:spLocks noGrp="1" noRot="1" noChangeAspect="1" noChangeArrowheads="1" noTextEdit="1"/>
-          </p:cNvSpPr>
-          <p:nvPr>
-            <p:ph type="sldImg"/>
-          </p:nvPr>
-        </p:nvSpPr>
-        <p:spPr>
-          <a:ln/>
-        </p:spPr>
-      </p:sp>
-      <p:sp>
-        <p:nvSpPr>
-          <p:cNvPr id="38915" name="Rectangle 3"/>
-          <p:cNvSpPr>
-            <a:spLocks noGrp="1" noChangeArrowheads="1"/>
-          </p:cNvSpPr>
-          <p:nvPr>
-            <p:ph type="body" idx="1"/>
-          </p:nvPr>
-        </p:nvSpPr>
-        <p:spPr/>
-        <p:txBody>
-          <a:bodyPr/>
-          <a:lstStyle/>
-          <a:p>
-            <a:endParaRPr lang="ja-JP" altLang="en-US" dirty="0"/>
           </a:p>
         </p:txBody>
       </p:sp>
     </p:spTree>
     <p:extLst>
       <p:ext uri="{BB962C8B-B14F-4D97-AF65-F5344CB8AC3E}">
-        <p14:creationId xmlns:p14="http://schemas.microsoft.com/office/powerpoint/2010/main" val="1621301740"/>
+        <p14:creationId xmlns:p14="http://schemas.microsoft.com/office/powerpoint/2010/main" val="51090003"/>
       </p:ext>
     </p:extLst>
   </p:cSld>
@@ -7678,80 +7937,106 @@
           <a:bodyPr/>
           <a:lstStyle/>
           <a:p>
-            <a:endParaRPr lang="en-US" dirty="0"/>
-          </a:p>
-        </p:txBody>
-      </p:sp>
-      <p:sp>
-        <p:nvSpPr>
-          <p:cNvPr id="3" name="Content Placeholder 2"/>
-          <p:cNvSpPr>
-            <a:spLocks noGrp="1"/>
-          </p:cNvSpPr>
+            <a:r>
+              <a:rPr lang="en-US" dirty="0"/>
+              <a:t>Data sets - Recap</a:t>
+            </a:r>
+          </a:p>
+        </p:txBody>
+      </p:sp>
+      <p:pic>
+        <p:nvPicPr>
+          <p:cNvPr id="4" name="Content Placeholder 3"/>
+          <p:cNvPicPr>
+            <a:picLocks noGrp="1" noChangeAspect="1"/>
+          </p:cNvPicPr>
           <p:nvPr>
             <p:ph idx="1"/>
           </p:nvPr>
-        </p:nvSpPr>
-        <p:spPr/>
-        <p:txBody>
-          <a:bodyPr/>
-          <a:lstStyle/>
-          <a:p>
-            <a:r>
-              <a:rPr lang="en-US" dirty="0" smtClean="0"/>
-              <a:t>Data sets </a:t>
-            </a:r>
-            <a:r>
-              <a:rPr lang="mr-IN" dirty="0" smtClean="0"/>
-              <a:t>–</a:t>
-            </a:r>
-            <a:r>
-              <a:rPr lang="en-US" dirty="0" smtClean="0"/>
-              <a:t> recap</a:t>
-            </a:r>
-          </a:p>
-          <a:p>
-            <a:r>
-              <a:rPr lang="en-US" dirty="0">
-                <a:solidFill>
-                  <a:srgbClr val="FF0000"/>
-                </a:solidFill>
-              </a:rPr>
-              <a:t>Categorical x </a:t>
-            </a:r>
-            <a:r>
-              <a:rPr lang="en-US" dirty="0" smtClean="0">
-                <a:solidFill>
-                  <a:srgbClr val="FF0000"/>
-                </a:solidFill>
-              </a:rPr>
-              <a:t>Numerical</a:t>
-            </a:r>
-          </a:p>
-          <a:p>
-            <a:r>
-              <a:rPr lang="en-US" dirty="0" smtClean="0"/>
-              <a:t>Sampling Distributions </a:t>
-            </a:r>
-          </a:p>
-          <a:p>
-            <a:r>
-              <a:rPr lang="en-US" dirty="0" smtClean="0"/>
-              <a:t>Point estimators</a:t>
-            </a:r>
-          </a:p>
-          <a:p>
-            <a:endParaRPr lang="en-US" dirty="0" smtClean="0"/>
-          </a:p>
-          <a:p>
-            <a:endParaRPr lang="en-US" dirty="0"/>
-          </a:p>
-        </p:txBody>
-      </p:sp>
+        </p:nvPicPr>
+        <p:blipFill>
+          <a:blip r:embed="rId2">
+            <a:extLst>
+              <a:ext uri="{28A0092B-C50C-407E-A947-70E740481C1C}">
+                <a14:useLocalDpi xmlns:a14="http://schemas.microsoft.com/office/drawing/2010/main" val="0"/>
+              </a:ext>
+            </a:extLst>
+          </a:blip>
+          <a:stretch>
+            <a:fillRect/>
+          </a:stretch>
+        </p:blipFill>
+        <p:spPr>
+          <a:xfrm>
+            <a:off x="560512" y="1988840"/>
+            <a:ext cx="8915400" cy="1924421"/>
+          </a:xfrm>
+        </p:spPr>
+      </p:pic>
+      <p:pic>
+        <p:nvPicPr>
+          <p:cNvPr id="5" name="Picture 4"/>
+          <p:cNvPicPr>
+            <a:picLocks noChangeAspect="1"/>
+          </p:cNvPicPr>
+          <p:nvPr/>
+        </p:nvPicPr>
+        <p:blipFill>
+          <a:blip r:embed="rId3">
+            <a:extLst>
+              <a:ext uri="{28A0092B-C50C-407E-A947-70E740481C1C}">
+                <a14:useLocalDpi xmlns:a14="http://schemas.microsoft.com/office/drawing/2010/main" val="0"/>
+              </a:ext>
+            </a:extLst>
+          </a:blip>
+          <a:stretch>
+            <a:fillRect/>
+          </a:stretch>
+        </p:blipFill>
+        <p:spPr>
+          <a:xfrm>
+            <a:off x="560512" y="4092626"/>
+            <a:ext cx="1587500" cy="495300"/>
+          </a:xfrm>
+          <a:prstGeom prst="rect">
+            <a:avLst/>
+          </a:prstGeom>
+        </p:spPr>
+      </p:pic>
+      <p:pic>
+        <p:nvPicPr>
+          <p:cNvPr id="6" name="Picture 5"/>
+          <p:cNvPicPr>
+            <a:picLocks noChangeAspect="1"/>
+          </p:cNvPicPr>
+          <p:nvPr/>
+        </p:nvPicPr>
+        <p:blipFill>
+          <a:blip r:embed="rId4">
+            <a:extLst>
+              <a:ext uri="{28A0092B-C50C-407E-A947-70E740481C1C}">
+                <a14:useLocalDpi xmlns:a14="http://schemas.microsoft.com/office/drawing/2010/main" val="0"/>
+              </a:ext>
+            </a:extLst>
+          </a:blip>
+          <a:stretch>
+            <a:fillRect/>
+          </a:stretch>
+        </p:blipFill>
+        <p:spPr>
+          <a:xfrm>
+            <a:off x="564526" y="4767291"/>
+            <a:ext cx="7264400" cy="1778000"/>
+          </a:xfrm>
+          <a:prstGeom prst="rect">
+            <a:avLst/>
+          </a:prstGeom>
+        </p:spPr>
+      </p:pic>
     </p:spTree>
     <p:extLst>
       <p:ext uri="{BB962C8B-B14F-4D97-AF65-F5344CB8AC3E}">
-        <p14:creationId xmlns:p14="http://schemas.microsoft.com/office/powerpoint/2010/main" val="1412354532"/>
+        <p14:creationId xmlns:p14="http://schemas.microsoft.com/office/powerpoint/2010/main" val="1495662573"/>
       </p:ext>
     </p:extLst>
   </p:cSld>
@@ -7759,6 +8044,13 @@
     <a:masterClrMapping/>
   </p:clrMapOvr>
   <p:transition spd="med"/>
+  <p:timing>
+    <p:tnLst>
+      <p:par>
+        <p:cTn id="1" dur="indefinite" restart="never" nodeType="tmRoot"/>
+      </p:par>
+    </p:tnLst>
+  </p:timing>
 </p:sld>
 </file>
 
@@ -7794,6 +8086,129 @@
           <a:bodyPr/>
           <a:lstStyle/>
           <a:p>
+            <a:endParaRPr lang="en-US" dirty="0"/>
+          </a:p>
+        </p:txBody>
+      </p:sp>
+      <p:sp>
+        <p:nvSpPr>
+          <p:cNvPr id="3" name="Content Placeholder 2"/>
+          <p:cNvSpPr>
+            <a:spLocks noGrp="1"/>
+          </p:cNvSpPr>
+          <p:nvPr>
+            <p:ph idx="1"/>
+          </p:nvPr>
+        </p:nvSpPr>
+        <p:spPr/>
+        <p:txBody>
+          <a:bodyPr/>
+          <a:lstStyle/>
+          <a:p>
+            <a:r>
+              <a:rPr lang="en-US" dirty="0" smtClean="0"/>
+              <a:t>Data sets </a:t>
+            </a:r>
+            <a:r>
+              <a:rPr lang="mr-IN" dirty="0" smtClean="0"/>
+              <a:t>–</a:t>
+            </a:r>
+            <a:r>
+              <a:rPr lang="en-US" dirty="0" smtClean="0"/>
+              <a:t> recap</a:t>
+            </a:r>
+          </a:p>
+          <a:p>
+            <a:r>
+              <a:rPr lang="en-US" dirty="0">
+                <a:solidFill>
+                  <a:srgbClr val="FF0000"/>
+                </a:solidFill>
+              </a:rPr>
+              <a:t>Categorical x </a:t>
+            </a:r>
+            <a:r>
+              <a:rPr lang="en-US" dirty="0" smtClean="0">
+                <a:solidFill>
+                  <a:srgbClr val="FF0000"/>
+                </a:solidFill>
+              </a:rPr>
+              <a:t>Numerical</a:t>
+            </a:r>
+          </a:p>
+          <a:p>
+            <a:r>
+              <a:rPr lang="en-US" dirty="0" smtClean="0"/>
+              <a:t>Sampling Distributions </a:t>
+            </a:r>
+          </a:p>
+          <a:p>
+            <a:r>
+              <a:rPr lang="en-US" dirty="0" smtClean="0"/>
+              <a:t>Point estimators</a:t>
+            </a:r>
+          </a:p>
+          <a:p>
+            <a:endParaRPr lang="en-US" dirty="0" smtClean="0"/>
+          </a:p>
+          <a:p>
+            <a:endParaRPr lang="en-US" dirty="0"/>
+          </a:p>
+        </p:txBody>
+      </p:sp>
+    </p:spTree>
+    <p:extLst>
+      <p:ext uri="{BB962C8B-B14F-4D97-AF65-F5344CB8AC3E}">
+        <p14:creationId xmlns:p14="http://schemas.microsoft.com/office/powerpoint/2010/main" val="1412354532"/>
+      </p:ext>
+    </p:extLst>
+  </p:cSld>
+  <p:clrMapOvr>
+    <a:masterClrMapping/>
+  </p:clrMapOvr>
+  <p:transition spd="med"/>
+  <p:timing>
+    <p:tnLst>
+      <p:par>
+        <p:cTn id="1" dur="indefinite" restart="never" nodeType="tmRoot"/>
+      </p:par>
+    </p:tnLst>
+  </p:timing>
+</p:sld>
+</file>
+
+<file path=ppt/slides/slide12.xml><?xml version="1.0" encoding="utf-8"?>
+<p:sld xmlns:a="http://schemas.openxmlformats.org/drawingml/2006/main" xmlns:r="http://schemas.openxmlformats.org/officeDocument/2006/relationships" xmlns:p="http://schemas.openxmlformats.org/presentationml/2006/main">
+  <p:cSld>
+    <p:spTree>
+      <p:nvGrpSpPr>
+        <p:cNvPr id="1" name=""/>
+        <p:cNvGrpSpPr/>
+        <p:nvPr/>
+      </p:nvGrpSpPr>
+      <p:grpSpPr>
+        <a:xfrm>
+          <a:off x="0" y="0"/>
+          <a:ext cx="0" cy="0"/>
+          <a:chOff x="0" y="0"/>
+          <a:chExt cx="0" cy="0"/>
+        </a:xfrm>
+      </p:grpSpPr>
+      <p:sp>
+        <p:nvSpPr>
+          <p:cNvPr id="2" name="Title 1"/>
+          <p:cNvSpPr>
+            <a:spLocks noGrp="1"/>
+          </p:cNvSpPr>
+          <p:nvPr>
+            <p:ph type="title"/>
+          </p:nvPr>
+        </p:nvSpPr>
+        <p:spPr/>
+        <p:txBody>
+          <a:bodyPr/>
+          <a:lstStyle/>
+          <a:p>
             <a:r>
               <a:rPr lang="en-US" dirty="0" smtClean="0"/>
               <a:t>Categorical x Numerical</a:t>
@@ -7858,10 +8273,17 @@
     <a:masterClrMapping/>
   </p:clrMapOvr>
   <p:transition spd="med"/>
+  <p:timing>
+    <p:tnLst>
+      <p:par>
+        <p:cTn id="1" dur="indefinite" restart="never" nodeType="tmRoot"/>
+      </p:par>
+    </p:tnLst>
+  </p:timing>
 </p:sld>
 </file>
 
-<file path=ppt/slides/slide12.xml><?xml version="1.0" encoding="utf-8"?>
+<file path=ppt/slides/slide13.xml><?xml version="1.0" encoding="utf-8"?>
 <p:sld xmlns:a="http://schemas.openxmlformats.org/drawingml/2006/main" xmlns:r="http://schemas.openxmlformats.org/officeDocument/2006/relationships" xmlns:p="http://schemas.openxmlformats.org/presentationml/2006/main">
   <p:cSld>
     <p:spTree>
@@ -7994,10 +8416,17 @@
     <a:masterClrMapping/>
   </p:clrMapOvr>
   <p:transition spd="med"/>
+  <p:timing>
+    <p:tnLst>
+      <p:par>
+        <p:cTn id="1" dur="indefinite" restart="never" nodeType="tmRoot"/>
+      </p:par>
+    </p:tnLst>
+  </p:timing>
 </p:sld>
 </file>
 
-<file path=ppt/slides/slide13.xml><?xml version="1.0" encoding="utf-8"?>
+<file path=ppt/slides/slide14.xml><?xml version="1.0" encoding="utf-8"?>
 <p:sld xmlns:a="http://schemas.openxmlformats.org/drawingml/2006/main" xmlns:r="http://schemas.openxmlformats.org/officeDocument/2006/relationships" xmlns:p="http://schemas.openxmlformats.org/presentationml/2006/main">
   <p:cSld>
     <p:spTree>
@@ -8100,127 +8529,13 @@
     <a:masterClrMapping/>
   </p:clrMapOvr>
   <p:transition spd="med"/>
-</p:sld>
-</file>
-
-<file path=ppt/slides/slide14.xml><?xml version="1.0" encoding="utf-8"?>
-<p:sld xmlns:a="http://schemas.openxmlformats.org/drawingml/2006/main" xmlns:r="http://schemas.openxmlformats.org/officeDocument/2006/relationships" xmlns:p="http://schemas.openxmlformats.org/presentationml/2006/main">
-  <p:cSld>
-    <p:spTree>
-      <p:nvGrpSpPr>
-        <p:cNvPr id="1" name=""/>
-        <p:cNvGrpSpPr/>
-        <p:nvPr/>
-      </p:nvGrpSpPr>
-      <p:grpSpPr>
-        <a:xfrm>
-          <a:off x="0" y="0"/>
-          <a:ext cx="0" cy="0"/>
-          <a:chOff x="0" y="0"/>
-          <a:chExt cx="0" cy="0"/>
-        </a:xfrm>
-      </p:grpSpPr>
-      <p:sp>
-        <p:nvSpPr>
-          <p:cNvPr id="2" name="Title 1"/>
-          <p:cNvSpPr>
-            <a:spLocks noGrp="1"/>
-          </p:cNvSpPr>
-          <p:nvPr>
-            <p:ph type="title"/>
-          </p:nvPr>
-        </p:nvSpPr>
-        <p:spPr/>
-        <p:txBody>
-          <a:bodyPr/>
-          <a:lstStyle/>
-          <a:p>
-            <a:r>
-              <a:rPr lang="en-US" dirty="0" smtClean="0"/>
-              <a:t>Categorical </a:t>
-            </a:r>
-            <a:r>
-              <a:rPr lang="en-US" smtClean="0"/>
-              <a:t>x Numerical</a:t>
-            </a:r>
-            <a:endParaRPr lang="en-US"/>
-          </a:p>
-        </p:txBody>
-      </p:sp>
-      <p:sp>
-        <p:nvSpPr>
-          <p:cNvPr id="3" name="Content Placeholder 2"/>
-          <p:cNvSpPr>
-            <a:spLocks noGrp="1"/>
-          </p:cNvSpPr>
-          <p:nvPr>
-            <p:ph idx="1"/>
-          </p:nvPr>
-        </p:nvSpPr>
-        <p:spPr/>
-        <p:txBody>
-          <a:bodyPr/>
-          <a:lstStyle/>
-          <a:p>
-            <a:r>
-              <a:rPr lang="en-US" dirty="0" err="1" smtClean="0">
-                <a:solidFill>
-                  <a:srgbClr val="FF0000"/>
-                </a:solidFill>
-              </a:rPr>
-              <a:t>Oldpeak</a:t>
-            </a:r>
-            <a:r>
-              <a:rPr lang="en-US" dirty="0" smtClean="0"/>
-              <a:t> has decimal numbers</a:t>
-            </a:r>
-          </a:p>
-          <a:p>
-            <a:r>
-              <a:rPr lang="en-US" dirty="0" smtClean="0"/>
-              <a:t>Range: </a:t>
-            </a:r>
-            <a:r>
-              <a:rPr lang="en-US" dirty="0" smtClean="0">
-                <a:solidFill>
-                  <a:schemeClr val="accent1"/>
-                </a:solidFill>
-              </a:rPr>
-              <a:t>[0,4]</a:t>
-            </a:r>
-          </a:p>
-          <a:p>
-            <a:r>
-              <a:rPr lang="en-US" dirty="0" smtClean="0"/>
-              <a:t>Obviously it is a </a:t>
-            </a:r>
-            <a:r>
-              <a:rPr lang="en-US" dirty="0" smtClean="0">
-                <a:solidFill>
-                  <a:srgbClr val="7030A0"/>
-                </a:solidFill>
-              </a:rPr>
-              <a:t>numerical variable</a:t>
-            </a:r>
-            <a:endParaRPr lang="en-US" dirty="0">
-              <a:solidFill>
-                <a:srgbClr val="7030A0"/>
-              </a:solidFill>
-            </a:endParaRPr>
-          </a:p>
-        </p:txBody>
-      </p:sp>
-    </p:spTree>
-    <p:extLst>
-      <p:ext uri="{BB962C8B-B14F-4D97-AF65-F5344CB8AC3E}">
-        <p14:creationId xmlns:p14="http://schemas.microsoft.com/office/powerpoint/2010/main" val="1850114150"/>
-      </p:ext>
-    </p:extLst>
-  </p:cSld>
-  <p:clrMapOvr>
-    <a:masterClrMapping/>
-  </p:clrMapOvr>
-  <p:transition spd="med"/>
+  <p:timing>
+    <p:tnLst>
+      <p:par>
+        <p:cTn id="1" dur="indefinite" restart="never" nodeType="tmRoot"/>
+      </p:par>
+    </p:tnLst>
+  </p:timing>
 </p:sld>
 </file>
 
@@ -8284,108 +8599,57 @@
           <a:lstStyle/>
           <a:p>
             <a:r>
-              <a:rPr lang="en-US" dirty="0" smtClean="0">
-                <a:solidFill>
-                  <a:srgbClr val="FF0000"/>
-                </a:solidFill>
-              </a:rPr>
-              <a:t>Sex</a:t>
-            </a:r>
-            <a:r>
-              <a:rPr lang="en-US" dirty="0" smtClean="0"/>
-              <a:t> and</a:t>
-            </a:r>
-            <a:r>
-              <a:rPr lang="en-US" dirty="0" smtClean="0">
-                <a:solidFill>
-                  <a:srgbClr val="FF0000"/>
-                </a:solidFill>
-              </a:rPr>
-              <a:t> </a:t>
-            </a:r>
-            <a:r>
               <a:rPr lang="en-US" dirty="0" err="1" smtClean="0">
                 <a:solidFill>
                   <a:srgbClr val="FF0000"/>
                 </a:solidFill>
               </a:rPr>
-              <a:t>Cp</a:t>
+              <a:t>Oldpeak</a:t>
+            </a:r>
+            <a:r>
+              <a:rPr lang="en-US" dirty="0" smtClean="0"/>
+              <a:t> has decimal numbers</a:t>
+            </a:r>
+          </a:p>
+          <a:p>
+            <a:r>
+              <a:rPr lang="en-US" dirty="0" smtClean="0"/>
+              <a:t>Range: </a:t>
             </a:r>
             <a:r>
               <a:rPr lang="en-US" dirty="0" smtClean="0">
                 <a:solidFill>
-                  <a:srgbClr val="FF0000"/>
+                  <a:schemeClr val="accent1"/>
                 </a:solidFill>
               </a:rPr>
-              <a:t> </a:t>
-            </a:r>
+              <a:t>[0,4]</a:t>
+            </a:r>
+          </a:p>
+          <a:p>
             <a:r>
               <a:rPr lang="en-US" dirty="0" smtClean="0"/>
-              <a:t>vary little</a:t>
-            </a:r>
-          </a:p>
-          <a:p>
-            <a:pPr lvl="1"/>
+              <a:t>Obviously it is a </a:t>
+            </a:r>
             <a:r>
               <a:rPr lang="en-US" dirty="0" smtClean="0">
                 <a:solidFill>
                   <a:srgbClr val="7030A0"/>
                 </a:solidFill>
               </a:rPr>
-              <a:t>Sex</a:t>
-            </a:r>
-            <a:r>
-              <a:rPr lang="en-US" dirty="0" smtClean="0"/>
-              <a:t>: {1,0} (Male or Female)</a:t>
-            </a:r>
-          </a:p>
-          <a:p>
-            <a:pPr lvl="1"/>
-            <a:r>
-              <a:rPr lang="en-US" dirty="0" err="1" smtClean="0">
-                <a:solidFill>
-                  <a:srgbClr val="7030A0"/>
-                </a:solidFill>
-              </a:rPr>
-              <a:t>Cp</a:t>
-            </a:r>
-            <a:r>
-              <a:rPr lang="en-US" dirty="0" smtClean="0"/>
-              <a:t>: {1,2,3,4} (None, Mild, Medium, Strong}</a:t>
-            </a:r>
-          </a:p>
-          <a:p>
-            <a:r>
-              <a:rPr lang="en-US" dirty="0" smtClean="0"/>
-              <a:t>Even if they are represented as numbers they could be classes</a:t>
-            </a:r>
-          </a:p>
-          <a:p>
-            <a:r>
-              <a:rPr lang="en-US" dirty="0" smtClean="0"/>
-              <a:t>We call them as </a:t>
-            </a:r>
-            <a:r>
-              <a:rPr lang="en-US" dirty="0" smtClean="0">
-                <a:solidFill>
-                  <a:srgbClr val="7030A0"/>
-                </a:solidFill>
-              </a:rPr>
-              <a:t>categorical variables</a:t>
-            </a:r>
-          </a:p>
-          <a:p>
-            <a:endParaRPr lang="en-US" dirty="0" smtClean="0"/>
-          </a:p>
-          <a:p>
-            <a:endParaRPr lang="en-US" dirty="0"/>
+              <a:t>numerical variable</a:t>
+            </a:r>
+            <a:endParaRPr lang="en-US" dirty="0">
+              <a:solidFill>
+                <a:srgbClr val="7030A0"/>
+              </a:solidFill>
+            </a:endParaRPr>
           </a:p>
         </p:txBody>
       </p:sp>
     </p:spTree>
     <p:extLst>
       <p:ext uri="{BB962C8B-B14F-4D97-AF65-F5344CB8AC3E}">
-        <p14:creationId xmlns:p14="http://schemas.microsoft.com/office/powerpoint/2010/main" val="798020628"/>
+        <p14:creationId xmlns:p14="http://schemas.microsoft.com/office/powerpoint/2010/main" val="1850114150"/>
       </p:ext>
     </p:extLst>
   </p:cSld>
@@ -8393,6 +8657,13 @@
     <a:masterClrMapping/>
   </p:clrMapOvr>
   <p:transition spd="med"/>
+  <p:timing>
+    <p:tnLst>
+      <p:par>
+        <p:cTn id="1" dur="indefinite" restart="never" nodeType="tmRoot"/>
+      </p:par>
+    </p:tnLst>
+  </p:timing>
 </p:sld>
 </file>
 
@@ -8430,6 +8701,185 @@
           <a:p>
             <a:r>
               <a:rPr lang="en-US" dirty="0" smtClean="0"/>
+              <a:t>Categorical </a:t>
+            </a:r>
+            <a:r>
+              <a:rPr lang="en-US" smtClean="0"/>
+              <a:t>x Numerical</a:t>
+            </a:r>
+            <a:endParaRPr lang="en-US"/>
+          </a:p>
+        </p:txBody>
+      </p:sp>
+      <p:sp>
+        <p:nvSpPr>
+          <p:cNvPr id="3" name="Content Placeholder 2"/>
+          <p:cNvSpPr>
+            <a:spLocks noGrp="1"/>
+          </p:cNvSpPr>
+          <p:nvPr>
+            <p:ph idx="1"/>
+          </p:nvPr>
+        </p:nvSpPr>
+        <p:spPr/>
+        <p:txBody>
+          <a:bodyPr/>
+          <a:lstStyle/>
+          <a:p>
+            <a:r>
+              <a:rPr lang="en-US" dirty="0" smtClean="0">
+                <a:solidFill>
+                  <a:srgbClr val="FF0000"/>
+                </a:solidFill>
+              </a:rPr>
+              <a:t>Sex</a:t>
+            </a:r>
+            <a:r>
+              <a:rPr lang="en-US" dirty="0" smtClean="0"/>
+              <a:t> and</a:t>
+            </a:r>
+            <a:r>
+              <a:rPr lang="en-US" dirty="0" smtClean="0">
+                <a:solidFill>
+                  <a:srgbClr val="FF0000"/>
+                </a:solidFill>
+              </a:rPr>
+              <a:t> </a:t>
+            </a:r>
+            <a:r>
+              <a:rPr lang="en-US" dirty="0" err="1" smtClean="0">
+                <a:solidFill>
+                  <a:srgbClr val="FF0000"/>
+                </a:solidFill>
+              </a:rPr>
+              <a:t>Cp</a:t>
+            </a:r>
+            <a:r>
+              <a:rPr lang="en-US" dirty="0" smtClean="0">
+                <a:solidFill>
+                  <a:srgbClr val="FF0000"/>
+                </a:solidFill>
+              </a:rPr>
+              <a:t> </a:t>
+            </a:r>
+            <a:r>
+              <a:rPr lang="en-US" dirty="0" smtClean="0"/>
+              <a:t>vary little</a:t>
+            </a:r>
+          </a:p>
+          <a:p>
+            <a:pPr lvl="1"/>
+            <a:r>
+              <a:rPr lang="en-US" dirty="0" smtClean="0">
+                <a:solidFill>
+                  <a:srgbClr val="7030A0"/>
+                </a:solidFill>
+              </a:rPr>
+              <a:t>Sex</a:t>
+            </a:r>
+            <a:r>
+              <a:rPr lang="en-US" dirty="0" smtClean="0"/>
+              <a:t>: {1,0} (Male or Female)</a:t>
+            </a:r>
+          </a:p>
+          <a:p>
+            <a:pPr lvl="1"/>
+            <a:r>
+              <a:rPr lang="en-US" dirty="0" err="1" smtClean="0">
+                <a:solidFill>
+                  <a:srgbClr val="7030A0"/>
+                </a:solidFill>
+              </a:rPr>
+              <a:t>Cp</a:t>
+            </a:r>
+            <a:r>
+              <a:rPr lang="en-US" dirty="0" smtClean="0"/>
+              <a:t>: {1,2,3,4} (None, Mild, Medium, Strong}</a:t>
+            </a:r>
+          </a:p>
+          <a:p>
+            <a:r>
+              <a:rPr lang="en-US" dirty="0" smtClean="0"/>
+              <a:t>Even if they are represented as numbers they could be classes</a:t>
+            </a:r>
+          </a:p>
+          <a:p>
+            <a:r>
+              <a:rPr lang="en-US" dirty="0" smtClean="0"/>
+              <a:t>We call them as </a:t>
+            </a:r>
+            <a:r>
+              <a:rPr lang="en-US" dirty="0" smtClean="0">
+                <a:solidFill>
+                  <a:srgbClr val="7030A0"/>
+                </a:solidFill>
+              </a:rPr>
+              <a:t>categorical variables</a:t>
+            </a:r>
+          </a:p>
+          <a:p>
+            <a:endParaRPr lang="en-US" dirty="0" smtClean="0"/>
+          </a:p>
+          <a:p>
+            <a:endParaRPr lang="en-US" dirty="0"/>
+          </a:p>
+        </p:txBody>
+      </p:sp>
+    </p:spTree>
+    <p:extLst>
+      <p:ext uri="{BB962C8B-B14F-4D97-AF65-F5344CB8AC3E}">
+        <p14:creationId xmlns:p14="http://schemas.microsoft.com/office/powerpoint/2010/main" val="798020628"/>
+      </p:ext>
+    </p:extLst>
+  </p:cSld>
+  <p:clrMapOvr>
+    <a:masterClrMapping/>
+  </p:clrMapOvr>
+  <p:transition spd="med"/>
+  <p:timing>
+    <p:tnLst>
+      <p:par>
+        <p:cTn id="1" dur="indefinite" restart="never" nodeType="tmRoot"/>
+      </p:par>
+    </p:tnLst>
+  </p:timing>
+</p:sld>
+</file>
+
+<file path=ppt/slides/slide17.xml><?xml version="1.0" encoding="utf-8"?>
+<p:sld xmlns:a="http://schemas.openxmlformats.org/drawingml/2006/main" xmlns:r="http://schemas.openxmlformats.org/officeDocument/2006/relationships" xmlns:p="http://schemas.openxmlformats.org/presentationml/2006/main">
+  <p:cSld>
+    <p:spTree>
+      <p:nvGrpSpPr>
+        <p:cNvPr id="1" name=""/>
+        <p:cNvGrpSpPr/>
+        <p:nvPr/>
+      </p:nvGrpSpPr>
+      <p:grpSpPr>
+        <a:xfrm>
+          <a:off x="0" y="0"/>
+          <a:ext cx="0" cy="0"/>
+          <a:chOff x="0" y="0"/>
+          <a:chExt cx="0" cy="0"/>
+        </a:xfrm>
+      </p:grpSpPr>
+      <p:sp>
+        <p:nvSpPr>
+          <p:cNvPr id="2" name="Title 1"/>
+          <p:cNvSpPr>
+            <a:spLocks noGrp="1"/>
+          </p:cNvSpPr>
+          <p:nvPr>
+            <p:ph type="title"/>
+          </p:nvPr>
+        </p:nvSpPr>
+        <p:spPr/>
+        <p:txBody>
+          <a:bodyPr/>
+          <a:lstStyle/>
+          <a:p>
+            <a:r>
+              <a:rPr lang="en-US" dirty="0" smtClean="0"/>
               <a:t>Categorical x Numerical</a:t>
             </a:r>
             <a:endParaRPr lang="en-US" dirty="0"/>
@@ -8586,10 +9036,17 @@
     <a:masterClrMapping/>
   </p:clrMapOvr>
   <p:transition spd="med"/>
+  <p:timing>
+    <p:tnLst>
+      <p:par>
+        <p:cTn id="1" dur="indefinite" restart="never" nodeType="tmRoot"/>
+      </p:par>
+    </p:tnLst>
+  </p:timing>
 </p:sld>
 </file>
 
-<file path=ppt/slides/slide17.xml><?xml version="1.0" encoding="utf-8"?>
+<file path=ppt/slides/slide18.xml><?xml version="1.0" encoding="utf-8"?>
 <p:sld xmlns:a="http://schemas.openxmlformats.org/drawingml/2006/main" xmlns:r="http://schemas.openxmlformats.org/officeDocument/2006/relationships" xmlns:p="http://schemas.openxmlformats.org/presentationml/2006/main">
   <p:cSld>
     <p:spTree>
@@ -8753,10 +9210,17 @@
     <a:masterClrMapping/>
   </p:clrMapOvr>
   <p:transition spd="med"/>
+  <p:timing>
+    <p:tnLst>
+      <p:par>
+        <p:cTn id="1" dur="indefinite" restart="never" nodeType="tmRoot"/>
+      </p:par>
+    </p:tnLst>
+  </p:timing>
 </p:sld>
 </file>
 
-<file path=ppt/slides/slide18.xml><?xml version="1.0" encoding="utf-8"?>
+<file path=ppt/slides/slide19.xml><?xml version="1.0" encoding="utf-8"?>
 <p:sld xmlns:a="http://schemas.openxmlformats.org/drawingml/2006/main" xmlns:r="http://schemas.openxmlformats.org/officeDocument/2006/relationships" xmlns:p="http://schemas.openxmlformats.org/presentationml/2006/main">
   <p:cSld>
     <p:spTree>
@@ -8817,11 +9281,7 @@
           <a:p>
             <a:r>
               <a:rPr lang="en-US" dirty="0" smtClean="0"/>
-              <a:t>Now let’s </a:t>
-            </a:r>
-            <a:r>
-              <a:rPr lang="en-US" dirty="0" smtClean="0"/>
-              <a:t>compare the plots</a:t>
+              <a:t>Now let’s compare the plots</a:t>
             </a:r>
             <a:endParaRPr lang="en-US" dirty="0"/>
           </a:p>
@@ -8946,118 +9406,13 @@
     <a:masterClrMapping/>
   </p:clrMapOvr>
   <p:transition spd="med"/>
-</p:sld>
-</file>
-
-<file path=ppt/slides/slide19.xml><?xml version="1.0" encoding="utf-8"?>
-<p:sld xmlns:a="http://schemas.openxmlformats.org/drawingml/2006/main" xmlns:r="http://schemas.openxmlformats.org/officeDocument/2006/relationships" xmlns:p="http://schemas.openxmlformats.org/presentationml/2006/main">
-  <p:cSld>
-    <p:spTree>
-      <p:nvGrpSpPr>
-        <p:cNvPr id="1" name=""/>
-        <p:cNvGrpSpPr/>
-        <p:nvPr/>
-      </p:nvGrpSpPr>
-      <p:grpSpPr>
-        <a:xfrm>
-          <a:off x="0" y="0"/>
-          <a:ext cx="0" cy="0"/>
-          <a:chOff x="0" y="0"/>
-          <a:chExt cx="0" cy="0"/>
-        </a:xfrm>
-      </p:grpSpPr>
-      <p:sp>
-        <p:nvSpPr>
-          <p:cNvPr id="2" name="Title 1"/>
-          <p:cNvSpPr>
-            <a:spLocks noGrp="1"/>
-          </p:cNvSpPr>
-          <p:nvPr>
-            <p:ph type="title"/>
-          </p:nvPr>
-        </p:nvSpPr>
-        <p:spPr/>
-        <p:txBody>
-          <a:bodyPr/>
-          <a:lstStyle/>
-          <a:p>
-            <a:endParaRPr lang="en-US" dirty="0"/>
-          </a:p>
-        </p:txBody>
-      </p:sp>
-      <p:sp>
-        <p:nvSpPr>
-          <p:cNvPr id="3" name="Content Placeholder 2"/>
-          <p:cNvSpPr>
-            <a:spLocks noGrp="1"/>
-          </p:cNvSpPr>
-          <p:nvPr>
-            <p:ph idx="1"/>
-          </p:nvPr>
-        </p:nvSpPr>
-        <p:spPr/>
-        <p:txBody>
-          <a:bodyPr/>
-          <a:lstStyle/>
-          <a:p>
-            <a:r>
-              <a:rPr lang="en-US" dirty="0" smtClean="0"/>
-              <a:t>Data sets </a:t>
-            </a:r>
-            <a:r>
-              <a:rPr lang="mr-IN" dirty="0" smtClean="0"/>
-              <a:t>–</a:t>
-            </a:r>
-            <a:r>
-              <a:rPr lang="en-US" dirty="0" smtClean="0"/>
-              <a:t> recap</a:t>
-            </a:r>
-          </a:p>
-          <a:p>
-            <a:r>
-              <a:rPr lang="en-US" dirty="0"/>
-              <a:t>Categorical x </a:t>
-            </a:r>
-            <a:r>
-              <a:rPr lang="en-US" dirty="0" smtClean="0"/>
-              <a:t>Numerical</a:t>
-            </a:r>
-          </a:p>
-          <a:p>
-            <a:r>
-              <a:rPr lang="en-US" dirty="0" smtClean="0">
-                <a:solidFill>
-                  <a:srgbClr val="FF0000"/>
-                </a:solidFill>
-              </a:rPr>
-              <a:t>Sampling distributions </a:t>
-            </a:r>
-          </a:p>
-          <a:p>
-            <a:r>
-              <a:rPr lang="en-US" dirty="0" smtClean="0"/>
-              <a:t>Point estimators</a:t>
-            </a:r>
-          </a:p>
-          <a:p>
-            <a:endParaRPr lang="en-US" dirty="0" smtClean="0"/>
-          </a:p>
-          <a:p>
-            <a:endParaRPr lang="en-US" dirty="0"/>
-          </a:p>
-        </p:txBody>
-      </p:sp>
-    </p:spTree>
-    <p:extLst>
-      <p:ext uri="{BB962C8B-B14F-4D97-AF65-F5344CB8AC3E}">
-        <p14:creationId xmlns:p14="http://schemas.microsoft.com/office/powerpoint/2010/main" val="286712351"/>
-      </p:ext>
-    </p:extLst>
-  </p:cSld>
-  <p:clrMapOvr>
-    <a:masterClrMapping/>
-  </p:clrMapOvr>
-  <p:transition spd="med"/>
+  <p:timing>
+    <p:tnLst>
+      <p:par>
+        <p:cTn id="1" dur="indefinite" restart="never" nodeType="tmRoot"/>
+      </p:par>
+    </p:tnLst>
+  </p:timing>
 </p:sld>
 </file>
 
@@ -9170,6 +9525,13 @@
     <a:masterClrMapping/>
   </p:clrMapOvr>
   <p:transition spd="med"/>
+  <p:timing>
+    <p:tnLst>
+      <p:par>
+        <p:cTn id="1" dur="indefinite" restart="never" nodeType="tmRoot"/>
+      </p:par>
+    </p:tnLst>
+  </p:timing>
 </p:sld>
 </file>
 
@@ -9207,7 +9569,7 @@
           <a:p>
             <a:r>
               <a:rPr lang="en-US" dirty="0" smtClean="0"/>
-              <a:t>Sampling Distributions</a:t>
+              <a:t>Categorical x Numerical pt.2</a:t>
             </a:r>
             <a:endParaRPr lang="en-US" dirty="0"/>
           </a:p>
@@ -9229,71 +9591,87 @@
           <a:lstStyle/>
           <a:p>
             <a:r>
-              <a:rPr lang="en-US" dirty="0"/>
-              <a:t>Randomly sampling from a population results in </a:t>
-            </a:r>
-            <a:r>
-              <a:rPr lang="en-US" dirty="0" smtClean="0">
-                <a:solidFill>
-                  <a:srgbClr val="7030A0"/>
-                </a:solidFill>
-              </a:rPr>
-              <a:t>random variables</a:t>
-            </a:r>
-            <a:r>
               <a:rPr lang="en-US" dirty="0" smtClean="0"/>
-              <a:t>. </a:t>
-            </a:r>
-            <a:r>
-              <a:rPr lang="en-US" dirty="0" smtClean="0">
-                <a:solidFill>
-                  <a:srgbClr val="7030A0"/>
-                </a:solidFill>
-              </a:rPr>
-              <a:t>Statistics</a:t>
+              <a:t>Load the </a:t>
+            </a:r>
+            <a:r>
+              <a:rPr lang="en-US" dirty="0" err="1" smtClean="0"/>
+              <a:t>Nelder-mead.txt</a:t>
             </a:r>
             <a:r>
               <a:rPr lang="en-US" dirty="0" smtClean="0"/>
-              <a:t> of these variable are also random</a:t>
-            </a:r>
+              <a:t> dataset</a:t>
+            </a:r>
+          </a:p>
+          <a:p>
+            <a:endParaRPr lang="en-US" dirty="0"/>
+          </a:p>
+          <a:p>
+            <a:endParaRPr lang="en-US" dirty="0" smtClean="0"/>
           </a:p>
           <a:p>
             <a:r>
               <a:rPr lang="en-US" dirty="0" smtClean="0"/>
-              <a:t>Being </a:t>
-            </a:r>
-            <a:r>
-              <a:rPr lang="en-US" dirty="0"/>
-              <a:t>random variables means that statistics also have their own probability distributions, called </a:t>
-            </a:r>
-            <a:r>
-              <a:rPr lang="en-US" dirty="0">
-                <a:solidFill>
-                  <a:srgbClr val="7030A0"/>
-                </a:solidFill>
-              </a:rPr>
-              <a:t>sampling </a:t>
-            </a:r>
-            <a:r>
-              <a:rPr lang="en-US" dirty="0" smtClean="0">
-                <a:solidFill>
-                  <a:srgbClr val="7030A0"/>
-                </a:solidFill>
-              </a:rPr>
-              <a:t>distributions</a:t>
-            </a:r>
+              <a:t>Run our common dataset functions</a:t>
+            </a:r>
+          </a:p>
+          <a:p>
+            <a:pPr lvl="1"/>
             <a:r>
               <a:rPr lang="en-US" dirty="0" smtClean="0"/>
-              <a:t>. </a:t>
-            </a:r>
-            <a:endParaRPr lang="en-US" dirty="0"/>
-          </a:p>
-        </p:txBody>
-      </p:sp>
+              <a:t>Names</a:t>
+            </a:r>
+          </a:p>
+          <a:p>
+            <a:pPr lvl="1"/>
+            <a:r>
+              <a:rPr lang="en-US" dirty="0" smtClean="0"/>
+              <a:t>Head</a:t>
+            </a:r>
+          </a:p>
+          <a:p>
+            <a:pPr lvl="1"/>
+            <a:r>
+              <a:rPr lang="en-US" dirty="0" smtClean="0"/>
+              <a:t>Summary</a:t>
+            </a:r>
+          </a:p>
+        </p:txBody>
+      </p:sp>
+      <p:pic>
+        <p:nvPicPr>
+          <p:cNvPr id="4" name="Picture 3"/>
+          <p:cNvPicPr>
+            <a:picLocks noChangeAspect="1"/>
+          </p:cNvPicPr>
+          <p:nvPr/>
+        </p:nvPicPr>
+        <p:blipFill>
+          <a:blip r:embed="rId2">
+            <a:extLst>
+              <a:ext uri="{28A0092B-C50C-407E-A947-70E740481C1C}">
+                <a14:useLocalDpi xmlns:a14="http://schemas.microsoft.com/office/drawing/2010/main" val="0"/>
+              </a:ext>
+            </a:extLst>
+          </a:blip>
+          <a:stretch>
+            <a:fillRect/>
+          </a:stretch>
+        </p:blipFill>
+        <p:spPr>
+          <a:xfrm>
+            <a:off x="1136576" y="2996952"/>
+            <a:ext cx="6616700" cy="304800"/>
+          </a:xfrm>
+          <a:prstGeom prst="rect">
+            <a:avLst/>
+          </a:prstGeom>
+        </p:spPr>
+      </p:pic>
     </p:spTree>
     <p:extLst>
       <p:ext uri="{BB962C8B-B14F-4D97-AF65-F5344CB8AC3E}">
-        <p14:creationId xmlns:p14="http://schemas.microsoft.com/office/powerpoint/2010/main" val="514749762"/>
+        <p14:creationId xmlns:p14="http://schemas.microsoft.com/office/powerpoint/2010/main" val="1749331844"/>
       </p:ext>
     </p:extLst>
   </p:cSld>
@@ -9338,14 +9716,495 @@
           <a:p>
             <a:r>
               <a:rPr lang="en-US" smtClean="0"/>
+              <a:t>Categorical x Numerical pt.2</a:t>
+            </a:r>
+            <a:endParaRPr lang="en-US"/>
+          </a:p>
+        </p:txBody>
+      </p:sp>
+      <p:sp>
+        <p:nvSpPr>
+          <p:cNvPr id="3" name="Content Placeholder 2"/>
+          <p:cNvSpPr>
+            <a:spLocks noGrp="1"/>
+          </p:cNvSpPr>
+          <p:nvPr>
+            <p:ph idx="1"/>
+          </p:nvPr>
+        </p:nvSpPr>
+        <p:spPr/>
+        <p:txBody>
+          <a:bodyPr/>
+          <a:lstStyle/>
+          <a:p>
+            <a:r>
+              <a:rPr lang="en-US" dirty="0" smtClean="0"/>
+              <a:t>Let’s check the dimension and </a:t>
+            </a:r>
+            <a:r>
+              <a:rPr lang="en-US" dirty="0" err="1" smtClean="0"/>
+              <a:t>method_start</a:t>
+            </a:r>
+            <a:r>
+              <a:rPr lang="en-US" dirty="0" smtClean="0"/>
+              <a:t> columns of the dataset</a:t>
+            </a:r>
+            <a:endParaRPr lang="en-US" dirty="0"/>
+          </a:p>
+          <a:p>
+            <a:pPr lvl="1"/>
+            <a:r>
+              <a:rPr lang="en-US" dirty="0" smtClean="0"/>
+              <a:t>Use the </a:t>
+            </a:r>
+            <a:r>
+              <a:rPr lang="en-US" dirty="0" smtClean="0">
+                <a:solidFill>
+                  <a:srgbClr val="FF0000"/>
+                </a:solidFill>
+              </a:rPr>
+              <a:t>unique() </a:t>
+            </a:r>
+            <a:r>
+              <a:rPr lang="en-US" dirty="0" smtClean="0"/>
+              <a:t>function</a:t>
+            </a:r>
+            <a:endParaRPr lang="en-US" dirty="0"/>
+          </a:p>
+        </p:txBody>
+      </p:sp>
+      <p:pic>
+        <p:nvPicPr>
+          <p:cNvPr id="5" name="Picture 4"/>
+          <p:cNvPicPr>
+            <a:picLocks noChangeAspect="1"/>
+          </p:cNvPicPr>
+          <p:nvPr/>
+        </p:nvPicPr>
+        <p:blipFill>
+          <a:blip r:embed="rId3">
+            <a:extLst>
+              <a:ext uri="{28A0092B-C50C-407E-A947-70E740481C1C}">
+                <a14:useLocalDpi xmlns:a14="http://schemas.microsoft.com/office/drawing/2010/main" val="0"/>
+              </a:ext>
+            </a:extLst>
+          </a:blip>
+          <a:stretch>
+            <a:fillRect/>
+          </a:stretch>
+        </p:blipFill>
+        <p:spPr>
+          <a:xfrm>
+            <a:off x="272480" y="4293096"/>
+            <a:ext cx="9537700" cy="1295400"/>
+          </a:xfrm>
+          <a:prstGeom prst="rect">
+            <a:avLst/>
+          </a:prstGeom>
+        </p:spPr>
+      </p:pic>
+    </p:spTree>
+    <p:extLst>
+      <p:ext uri="{BB962C8B-B14F-4D97-AF65-F5344CB8AC3E}">
+        <p14:creationId xmlns:p14="http://schemas.microsoft.com/office/powerpoint/2010/main" val="1881553753"/>
+      </p:ext>
+    </p:extLst>
+  </p:cSld>
+  <p:clrMapOvr>
+    <a:masterClrMapping/>
+  </p:clrMapOvr>
+  <p:transition spd="med"/>
+</p:sld>
+</file>
+
+<file path=ppt/slides/slide22.xml><?xml version="1.0" encoding="utf-8"?>
+<p:sld xmlns:a="http://schemas.openxmlformats.org/drawingml/2006/main" xmlns:r="http://schemas.openxmlformats.org/officeDocument/2006/relationships" xmlns:p="http://schemas.openxmlformats.org/presentationml/2006/main">
+  <p:cSld>
+    <p:spTree>
+      <p:nvGrpSpPr>
+        <p:cNvPr id="1" name=""/>
+        <p:cNvGrpSpPr/>
+        <p:nvPr/>
+      </p:nvGrpSpPr>
+      <p:grpSpPr>
+        <a:xfrm>
+          <a:off x="0" y="0"/>
+          <a:ext cx="0" cy="0"/>
+          <a:chOff x="0" y="0"/>
+          <a:chExt cx="0" cy="0"/>
+        </a:xfrm>
+      </p:grpSpPr>
+      <p:sp>
+        <p:nvSpPr>
+          <p:cNvPr id="2" name="Title 1"/>
+          <p:cNvSpPr>
+            <a:spLocks noGrp="1"/>
+          </p:cNvSpPr>
+          <p:nvPr>
+            <p:ph type="title"/>
+          </p:nvPr>
+        </p:nvSpPr>
+        <p:spPr/>
+        <p:txBody>
+          <a:bodyPr/>
+          <a:lstStyle/>
+          <a:p>
+            <a:r>
+              <a:rPr lang="en-US" smtClean="0"/>
+              <a:t>Categorical x Numerical pt.2</a:t>
+            </a:r>
+            <a:endParaRPr lang="en-US"/>
+          </a:p>
+        </p:txBody>
+      </p:sp>
+      <p:sp>
+        <p:nvSpPr>
+          <p:cNvPr id="3" name="Content Placeholder 2"/>
+          <p:cNvSpPr>
+            <a:spLocks noGrp="1"/>
+          </p:cNvSpPr>
+          <p:nvPr>
+            <p:ph idx="1"/>
+          </p:nvPr>
+        </p:nvSpPr>
+        <p:spPr/>
+        <p:txBody>
+          <a:bodyPr/>
+          <a:lstStyle/>
+          <a:p>
+            <a:r>
+              <a:rPr lang="en-US" dirty="0" smtClean="0"/>
+              <a:t>Which variables are categorical?</a:t>
+            </a:r>
+          </a:p>
+          <a:p>
+            <a:r>
+              <a:rPr lang="en-US" dirty="0" smtClean="0"/>
+              <a:t>Which are numerical?</a:t>
+            </a:r>
+          </a:p>
+          <a:p>
+            <a:r>
+              <a:rPr lang="en-US" dirty="0" smtClean="0"/>
+              <a:t>Which variables should I plot?</a:t>
+            </a:r>
+            <a:endParaRPr lang="en-US" dirty="0"/>
+          </a:p>
+        </p:txBody>
+      </p:sp>
+    </p:spTree>
+    <p:extLst>
+      <p:ext uri="{BB962C8B-B14F-4D97-AF65-F5344CB8AC3E}">
+        <p14:creationId xmlns:p14="http://schemas.microsoft.com/office/powerpoint/2010/main" val="422648454"/>
+      </p:ext>
+    </p:extLst>
+  </p:cSld>
+  <p:clrMapOvr>
+    <a:masterClrMapping/>
+  </p:clrMapOvr>
+  <p:transition spd="med"/>
+</p:sld>
+</file>
+
+<file path=ppt/slides/slide23.xml><?xml version="1.0" encoding="utf-8"?>
+<p:sld xmlns:a="http://schemas.openxmlformats.org/drawingml/2006/main" xmlns:r="http://schemas.openxmlformats.org/officeDocument/2006/relationships" xmlns:p="http://schemas.openxmlformats.org/presentationml/2006/main">
+  <p:cSld>
+    <p:spTree>
+      <p:nvGrpSpPr>
+        <p:cNvPr id="1" name=""/>
+        <p:cNvGrpSpPr/>
+        <p:nvPr/>
+      </p:nvGrpSpPr>
+      <p:grpSpPr>
+        <a:xfrm>
+          <a:off x="0" y="0"/>
+          <a:ext cx="0" cy="0"/>
+          <a:chOff x="0" y="0"/>
+          <a:chExt cx="0" cy="0"/>
+        </a:xfrm>
+      </p:grpSpPr>
+      <p:sp>
+        <p:nvSpPr>
+          <p:cNvPr id="2" name="Title 1"/>
+          <p:cNvSpPr>
+            <a:spLocks noGrp="1"/>
+          </p:cNvSpPr>
+          <p:nvPr>
+            <p:ph type="title"/>
+          </p:nvPr>
+        </p:nvSpPr>
+        <p:spPr/>
+        <p:txBody>
+          <a:bodyPr/>
+          <a:lstStyle/>
+          <a:p>
+            <a:endParaRPr lang="en-US" dirty="0"/>
+          </a:p>
+        </p:txBody>
+      </p:sp>
+      <p:sp>
+        <p:nvSpPr>
+          <p:cNvPr id="3" name="Content Placeholder 2"/>
+          <p:cNvSpPr>
+            <a:spLocks noGrp="1"/>
+          </p:cNvSpPr>
+          <p:nvPr>
+            <p:ph idx="1"/>
+          </p:nvPr>
+        </p:nvSpPr>
+        <p:spPr/>
+        <p:txBody>
+          <a:bodyPr/>
+          <a:lstStyle/>
+          <a:p>
+            <a:r>
+              <a:rPr lang="en-US" dirty="0" smtClean="0"/>
+              <a:t>Data sets </a:t>
+            </a:r>
+            <a:r>
+              <a:rPr lang="mr-IN" dirty="0" smtClean="0"/>
+              <a:t>–</a:t>
+            </a:r>
+            <a:r>
+              <a:rPr lang="en-US" dirty="0" smtClean="0"/>
+              <a:t> recap</a:t>
+            </a:r>
+          </a:p>
+          <a:p>
+            <a:r>
+              <a:rPr lang="en-US" dirty="0"/>
+              <a:t>Categorical x </a:t>
+            </a:r>
+            <a:r>
+              <a:rPr lang="en-US" dirty="0" smtClean="0"/>
+              <a:t>Numerical</a:t>
+            </a:r>
+          </a:p>
+          <a:p>
+            <a:r>
+              <a:rPr lang="en-US" dirty="0" smtClean="0">
+                <a:solidFill>
+                  <a:srgbClr val="FF0000"/>
+                </a:solidFill>
+              </a:rPr>
+              <a:t>Sampling distributions </a:t>
+            </a:r>
+          </a:p>
+          <a:p>
+            <a:r>
+              <a:rPr lang="en-US" dirty="0" smtClean="0"/>
+              <a:t>Point estimators</a:t>
+            </a:r>
+          </a:p>
+          <a:p>
+            <a:endParaRPr lang="en-US" dirty="0" smtClean="0"/>
+          </a:p>
+          <a:p>
+            <a:endParaRPr lang="en-US" dirty="0"/>
+          </a:p>
+        </p:txBody>
+      </p:sp>
+    </p:spTree>
+    <p:extLst>
+      <p:ext uri="{BB962C8B-B14F-4D97-AF65-F5344CB8AC3E}">
+        <p14:creationId xmlns:p14="http://schemas.microsoft.com/office/powerpoint/2010/main" val="286712351"/>
+      </p:ext>
+    </p:extLst>
+  </p:cSld>
+  <p:clrMapOvr>
+    <a:masterClrMapping/>
+  </p:clrMapOvr>
+  <p:transition spd="med"/>
+  <p:timing>
+    <p:tnLst>
+      <p:par>
+        <p:cTn id="1" dur="indefinite" restart="never" nodeType="tmRoot"/>
+      </p:par>
+    </p:tnLst>
+  </p:timing>
+</p:sld>
+</file>
+
+<file path=ppt/slides/slide24.xml><?xml version="1.0" encoding="utf-8"?>
+<p:sld xmlns:a="http://schemas.openxmlformats.org/drawingml/2006/main" xmlns:r="http://schemas.openxmlformats.org/officeDocument/2006/relationships" xmlns:p="http://schemas.openxmlformats.org/presentationml/2006/main">
+  <p:cSld>
+    <p:spTree>
+      <p:nvGrpSpPr>
+        <p:cNvPr id="1" name=""/>
+        <p:cNvGrpSpPr/>
+        <p:nvPr/>
+      </p:nvGrpSpPr>
+      <p:grpSpPr>
+        <a:xfrm>
+          <a:off x="0" y="0"/>
+          <a:ext cx="0" cy="0"/>
+          <a:chOff x="0" y="0"/>
+          <a:chExt cx="0" cy="0"/>
+        </a:xfrm>
+      </p:grpSpPr>
+      <p:sp>
+        <p:nvSpPr>
+          <p:cNvPr id="2" name="Title 1"/>
+          <p:cNvSpPr>
+            <a:spLocks noGrp="1"/>
+          </p:cNvSpPr>
+          <p:nvPr>
+            <p:ph type="title"/>
+          </p:nvPr>
+        </p:nvSpPr>
+        <p:spPr/>
+        <p:txBody>
+          <a:bodyPr/>
+          <a:lstStyle/>
+          <a:p>
+            <a:r>
+              <a:rPr lang="en-US" dirty="0" smtClean="0"/>
               <a:t>Sampling Distributions</a:t>
             </a:r>
+            <a:endParaRPr lang="en-US" dirty="0"/>
+          </a:p>
+        </p:txBody>
+      </p:sp>
+      <p:sp>
+        <p:nvSpPr>
+          <p:cNvPr id="3" name="Content Placeholder 2"/>
+          <p:cNvSpPr>
+            <a:spLocks noGrp="1"/>
+          </p:cNvSpPr>
+          <p:nvPr>
+            <p:ph idx="1"/>
+          </p:nvPr>
+        </p:nvSpPr>
+        <p:spPr/>
+        <p:txBody>
+          <a:bodyPr/>
+          <a:lstStyle/>
+          <a:p>
+            <a:r>
+              <a:rPr lang="en-US" dirty="0"/>
+              <a:t>Randomly sampling from a population results in </a:t>
+            </a:r>
+            <a:r>
+              <a:rPr lang="en-US" dirty="0" smtClean="0">
+                <a:solidFill>
+                  <a:srgbClr val="7030A0"/>
+                </a:solidFill>
+              </a:rPr>
+              <a:t>random variables</a:t>
+            </a:r>
+            <a:r>
+              <a:rPr lang="en-US" dirty="0" smtClean="0"/>
+              <a:t>. </a:t>
+            </a:r>
+            <a:r>
+              <a:rPr lang="en-US" dirty="0" smtClean="0">
+                <a:solidFill>
+                  <a:srgbClr val="7030A0"/>
+                </a:solidFill>
+              </a:rPr>
+              <a:t>Statistics</a:t>
+            </a:r>
+            <a:r>
+              <a:rPr lang="en-US" dirty="0" smtClean="0"/>
+              <a:t> of these variable are also random</a:t>
+            </a:r>
+          </a:p>
+          <a:p>
+            <a:r>
+              <a:rPr lang="en-US" dirty="0" smtClean="0"/>
+              <a:t>Being </a:t>
+            </a:r>
+            <a:r>
+              <a:rPr lang="en-US" dirty="0"/>
+              <a:t>random variables means that statistics also have their own probability distributions, called </a:t>
+            </a:r>
+            <a:r>
+              <a:rPr lang="en-US" dirty="0">
+                <a:solidFill>
+                  <a:srgbClr val="7030A0"/>
+                </a:solidFill>
+              </a:rPr>
+              <a:t>sampling </a:t>
+            </a:r>
+            <a:r>
+              <a:rPr lang="en-US" dirty="0" smtClean="0">
+                <a:solidFill>
+                  <a:srgbClr val="7030A0"/>
+                </a:solidFill>
+              </a:rPr>
+              <a:t>distributions</a:t>
+            </a:r>
+            <a:r>
+              <a:rPr lang="en-US" dirty="0" smtClean="0"/>
+              <a:t>. </a:t>
+            </a:r>
+            <a:endParaRPr lang="en-US" dirty="0"/>
+          </a:p>
+        </p:txBody>
+      </p:sp>
+    </p:spTree>
+    <p:extLst>
+      <p:ext uri="{BB962C8B-B14F-4D97-AF65-F5344CB8AC3E}">
+        <p14:creationId xmlns:p14="http://schemas.microsoft.com/office/powerpoint/2010/main" val="514749762"/>
+      </p:ext>
+    </p:extLst>
+  </p:cSld>
+  <p:clrMapOvr>
+    <a:masterClrMapping/>
+  </p:clrMapOvr>
+  <p:transition spd="med"/>
+  <p:timing>
+    <p:tnLst>
+      <p:par>
+        <p:cTn id="1" dur="indefinite" restart="never" nodeType="tmRoot"/>
+      </p:par>
+    </p:tnLst>
+  </p:timing>
+</p:sld>
+</file>
+
+<file path=ppt/slides/slide25.xml><?xml version="1.0" encoding="utf-8"?>
+<p:sld xmlns:a="http://schemas.openxmlformats.org/drawingml/2006/main" xmlns:r="http://schemas.openxmlformats.org/officeDocument/2006/relationships" xmlns:p="http://schemas.openxmlformats.org/presentationml/2006/main">
+  <p:cSld>
+    <p:spTree>
+      <p:nvGrpSpPr>
+        <p:cNvPr id="1" name=""/>
+        <p:cNvGrpSpPr/>
+        <p:nvPr/>
+      </p:nvGrpSpPr>
+      <p:grpSpPr>
+        <a:xfrm>
+          <a:off x="0" y="0"/>
+          <a:ext cx="0" cy="0"/>
+          <a:chOff x="0" y="0"/>
+          <a:chExt cx="0" cy="0"/>
+        </a:xfrm>
+      </p:grpSpPr>
+      <p:sp>
+        <p:nvSpPr>
+          <p:cNvPr id="2" name="Title 1"/>
+          <p:cNvSpPr>
+            <a:spLocks noGrp="1"/>
+          </p:cNvSpPr>
+          <p:nvPr>
+            <p:ph type="title"/>
+          </p:nvPr>
+        </p:nvSpPr>
+        <p:spPr/>
+        <p:txBody>
+          <a:bodyPr/>
+          <a:lstStyle/>
+          <a:p>
+            <a:r>
+              <a:rPr lang="en-US" smtClean="0"/>
+              <a:t>Sampling Distributions</a:t>
+            </a:r>
             <a:endParaRPr lang="en-US"/>
           </a:p>
         </p:txBody>
       </p:sp>
-      <mc:AlternateContent xmlns:mc="http://schemas.openxmlformats.org/markup-compatibility/2006">
-        <mc:Choice xmlns:a14="http://schemas.microsoft.com/office/drawing/2010/main" Requires="a14">
+      <mc:AlternateContent xmlns:mc="http://schemas.openxmlformats.org/markup-compatibility/2006" xmlns:a14="http://schemas.microsoft.com/office/drawing/2010/main">
+        <mc:Choice Requires="a14">
           <p:sp>
             <p:nvSpPr>
               <p:cNvPr id="3" name="Content Placeholder 2"/>
@@ -9557,15 +10416,7 @@
                       <a:srgbClr val="FF0000"/>
                     </a:solidFill>
                   </a:rPr>
-                  <a:t> for normal </a:t>
-                </a:r>
-                <a:r>
-                  <a:rPr lang="en-US" sz="2000" dirty="0" smtClean="0">
-                    <a:solidFill>
-                      <a:srgbClr val="FF0000"/>
-                    </a:solidFill>
-                  </a:rPr>
-                  <a:t>distribution</a:t>
+                  <a:t> for normal distribution</a:t>
                 </a:r>
               </a:p>
               <a:p>
@@ -9607,20 +10458,11 @@
                   </a:rPr>
                   <a:t>(PDF)</a:t>
                 </a:r>
-                <a:endParaRPr lang="en-US" sz="2000" dirty="0" smtClean="0">
-                  <a:solidFill>
-                    <a:srgbClr val="FF0000"/>
-                  </a:solidFill>
-                </a:endParaRPr>
               </a:p>
               <a:p>
                 <a:r>
                   <a:rPr lang="en-US" dirty="0" smtClean="0"/>
-                  <a:t>We obtain random samples drawn </a:t>
-                </a:r>
-                <a:r>
-                  <a:rPr lang="en-US" dirty="0" smtClean="0"/>
-                  <a:t>from          </a:t>
+                  <a:t>We obtain random samples drawn from          </a:t>
                 </a:r>
                 <a14:m>
                   <m:oMath xmlns:m="http://schemas.openxmlformats.org/officeDocument/2006/math">
@@ -9816,7 +10658,7 @@
             </p:txBody>
           </p:sp>
         </mc:Choice>
-        <mc:Fallback>
+        <mc:Fallback xmlns="">
           <p:sp>
             <p:nvSpPr>
               <p:cNvPr id="3" name="Content Placeholder 2"/>
@@ -9861,10 +10703,17 @@
     <a:masterClrMapping/>
   </p:clrMapOvr>
   <p:transition spd="med"/>
+  <p:timing>
+    <p:tnLst>
+      <p:par>
+        <p:cTn id="1" dur="indefinite" restart="never" nodeType="tmRoot"/>
+      </p:par>
+    </p:tnLst>
+  </p:timing>
 </p:sld>
 </file>
 
-<file path=ppt/slides/slide22.xml><?xml version="1.0" encoding="utf-8"?>
+<file path=ppt/slides/slide26.xml><?xml version="1.0" encoding="utf-8"?>
 <p:sld xmlns:a="http://schemas.openxmlformats.org/drawingml/2006/main" xmlns:r="http://schemas.openxmlformats.org/officeDocument/2006/relationships" xmlns:p="http://schemas.openxmlformats.org/presentationml/2006/main">
   <p:cSld>
     <p:spTree>
@@ -9951,15 +10800,7 @@
                   <a:schemeClr val="bg2"/>
                 </a:solidFill>
               </a:rPr>
-              <a:t>Chi-squared distribution (time series, intervals</a:t>
-            </a:r>
-            <a:r>
-              <a:rPr lang="en-US" dirty="0" smtClean="0">
-                <a:solidFill>
-                  <a:schemeClr val="bg2"/>
-                </a:solidFill>
-              </a:rPr>
-              <a:t>)</a:t>
+              <a:t>Chi-squared distribution (time series, intervals)</a:t>
             </a:r>
           </a:p>
           <a:p>
@@ -9972,11 +10813,6 @@
               </a:rPr>
               <a:t>t Distribution (similar to normal, longer tails)</a:t>
             </a:r>
-            <a:endParaRPr lang="en-US" dirty="0" smtClean="0">
-              <a:solidFill>
-                <a:schemeClr val="bg2"/>
-              </a:solidFill>
-            </a:endParaRPr>
           </a:p>
         </p:txBody>
       </p:sp>
@@ -9991,10 +10827,17 @@
     <a:masterClrMapping/>
   </p:clrMapOvr>
   <p:transition spd="med"/>
+  <p:timing>
+    <p:tnLst>
+      <p:par>
+        <p:cTn id="1" dur="indefinite" restart="never" nodeType="tmRoot"/>
+      </p:par>
+    </p:tnLst>
+  </p:timing>
 </p:sld>
 </file>
 
-<file path=ppt/slides/slide23.xml><?xml version="1.0" encoding="utf-8"?>
+<file path=ppt/slides/slide27.xml><?xml version="1.0" encoding="utf-8"?>
 <p:sld xmlns:a="http://schemas.openxmlformats.org/drawingml/2006/main" xmlns:r="http://schemas.openxmlformats.org/officeDocument/2006/relationships" xmlns:p="http://schemas.openxmlformats.org/presentationml/2006/main">
   <p:cSld>
     <p:spTree>
@@ -10230,10 +11073,17 @@
     <a:masterClrMapping/>
   </p:clrMapOvr>
   <p:transition spd="med"/>
+  <p:timing>
+    <p:tnLst>
+      <p:par>
+        <p:cTn id="1" dur="indefinite" restart="never" nodeType="tmRoot"/>
+      </p:par>
+    </p:tnLst>
+  </p:timing>
 </p:sld>
 </file>
 
-<file path=ppt/slides/slide24.xml><?xml version="1.0" encoding="utf-8"?>
+<file path=ppt/slides/slide28.xml><?xml version="1.0" encoding="utf-8"?>
 <p:sld xmlns:a="http://schemas.openxmlformats.org/drawingml/2006/main" xmlns:r="http://schemas.openxmlformats.org/officeDocument/2006/relationships" xmlns:p="http://schemas.openxmlformats.org/presentationml/2006/main">
   <p:cSld>
     <p:spTree>
@@ -10273,8 +11123,8 @@
           </a:p>
         </p:txBody>
       </p:sp>
-      <mc:AlternateContent xmlns:mc="http://schemas.openxmlformats.org/markup-compatibility/2006">
-        <mc:Choice xmlns:a14="http://schemas.microsoft.com/office/drawing/2010/main" Requires="a14">
+      <mc:AlternateContent xmlns:mc="http://schemas.openxmlformats.org/markup-compatibility/2006" xmlns:a14="http://schemas.microsoft.com/office/drawing/2010/main">
+        <mc:Choice Requires="a14">
           <p:sp>
             <p:nvSpPr>
               <p:cNvPr id="3" name="Content Placeholder 2"/>
@@ -10292,17 +11142,8 @@
               <a:p>
                 <a:r>
                   <a:rPr lang="en-US" dirty="0" smtClean="0"/>
-                  <a:t>Univariate </a:t>
+                  <a:t>Univariate and Multivariate</a:t>
                 </a:r>
-                <a:r>
-                  <a:rPr lang="en-US" dirty="0" smtClean="0"/>
-                  <a:t>and </a:t>
-                </a:r>
-                <a:r>
-                  <a:rPr lang="en-US" dirty="0" smtClean="0"/>
-                  <a:t>Multivariate</a:t>
-                </a:r>
-                <a:endParaRPr lang="en-US" dirty="0" smtClean="0"/>
               </a:p>
               <a:p>
                 <a:pPr lvl="1"/>
@@ -10467,7 +11308,7 @@
                     <m:sSup>
                       <m:sSupPr>
                         <m:ctrlPr>
-                          <a:rPr lang="en-US" b="0" i="0" smtClean="0">
+                          <a:rPr lang="en-US" b="0" i="1" smtClean="0">
                             <a:latin typeface="Cambria Math" charset="0"/>
                           </a:rPr>
                         </m:ctrlPr>
@@ -10524,7 +11365,7 @@
             </p:txBody>
           </p:sp>
         </mc:Choice>
-        <mc:Fallback>
+        <mc:Fallback xmlns="">
           <p:sp>
             <p:nvSpPr>
               <p:cNvPr id="3" name="Content Placeholder 2"/>
@@ -10618,8 +11459,8 @@
           </a:prstGeom>
         </p:spPr>
       </p:pic>
-      <mc:AlternateContent xmlns:mc="http://schemas.openxmlformats.org/markup-compatibility/2006">
-        <mc:Choice xmlns:a14="http://schemas.microsoft.com/office/drawing/2010/main" Requires="a14">
+      <mc:AlternateContent xmlns:mc="http://schemas.openxmlformats.org/markup-compatibility/2006" xmlns:a14="http://schemas.microsoft.com/office/drawing/2010/main">
+        <mc:Choice Requires="a14">
           <p:sp>
             <p:nvSpPr>
               <p:cNvPr id="6" name="TextBox 5"/>
@@ -10691,7 +11532,7 @@
             </p:txBody>
           </p:sp>
         </mc:Choice>
-        <mc:Fallback>
+        <mc:Fallback xmlns="">
           <p:sp>
             <p:nvSpPr>
               <p:cNvPr id="6" name="TextBox 5"/>
@@ -10741,10 +11582,17 @@
     <a:masterClrMapping/>
   </p:clrMapOvr>
   <p:transition spd="med"/>
+  <p:timing>
+    <p:tnLst>
+      <p:par>
+        <p:cTn id="1" dur="indefinite" restart="never" nodeType="tmRoot"/>
+      </p:par>
+    </p:tnLst>
+  </p:timing>
 </p:sld>
 </file>
 
-<file path=ppt/slides/slide25.xml><?xml version="1.0" encoding="utf-8"?>
+<file path=ppt/slides/slide29.xml><?xml version="1.0" encoding="utf-8"?>
 <p:sld xmlns:a="http://schemas.openxmlformats.org/drawingml/2006/main" xmlns:r="http://schemas.openxmlformats.org/officeDocument/2006/relationships" xmlns:p="http://schemas.openxmlformats.org/presentationml/2006/main">
   <p:cSld>
     <p:spTree>
@@ -10987,10 +11835,17 @@
     <a:masterClrMapping/>
   </p:clrMapOvr>
   <p:transition spd="med"/>
+  <p:timing>
+    <p:tnLst>
+      <p:par>
+        <p:cTn id="1" dur="indefinite" restart="never" nodeType="tmRoot"/>
+      </p:par>
+    </p:tnLst>
+  </p:timing>
 </p:sld>
 </file>
 
-<file path=ppt/slides/slide26.xml><?xml version="1.0" encoding="utf-8"?>
+<file path=ppt/slides/slide3.xml><?xml version="1.0" encoding="utf-8"?>
 <p:sld xmlns:a="http://schemas.openxmlformats.org/drawingml/2006/main" xmlns:r="http://schemas.openxmlformats.org/officeDocument/2006/relationships" xmlns:p="http://schemas.openxmlformats.org/presentationml/2006/main">
   <p:cSld>
     <p:spTree>
@@ -11023,14 +11878,135 @@
           <a:lstStyle/>
           <a:p>
             <a:r>
+              <a:rPr lang="en-US" dirty="0" smtClean="0"/>
+              <a:t>Before we Begin</a:t>
+            </a:r>
+            <a:endParaRPr lang="en-US" dirty="0"/>
+          </a:p>
+        </p:txBody>
+      </p:sp>
+      <p:sp>
+        <p:nvSpPr>
+          <p:cNvPr id="3" name="Content Placeholder 2"/>
+          <p:cNvSpPr>
+            <a:spLocks noGrp="1"/>
+          </p:cNvSpPr>
+          <p:nvPr>
+            <p:ph idx="1"/>
+          </p:nvPr>
+        </p:nvSpPr>
+        <p:spPr/>
+        <p:txBody>
+          <a:bodyPr/>
+          <a:lstStyle/>
+          <a:p>
+            <a:r>
+              <a:rPr lang="en-US" dirty="0" smtClean="0"/>
+              <a:t>Go to the </a:t>
+            </a:r>
+            <a:r>
+              <a:rPr lang="en-US" dirty="0" err="1" smtClean="0"/>
+              <a:t>github</a:t>
+            </a:r>
+            <a:r>
+              <a:rPr lang="en-US" dirty="0" smtClean="0"/>
+              <a:t> repo:</a:t>
+            </a:r>
+          </a:p>
+          <a:p>
+            <a:pPr lvl="1"/>
+            <a:r>
+              <a:rPr lang="en-US" dirty="0">
+                <a:hlinkClick r:id="rId2"/>
+              </a:rPr>
+              <a:t>https://</a:t>
+            </a:r>
+            <a:r>
+              <a:rPr lang="en-US" dirty="0" err="1">
+                <a:hlinkClick r:id="rId2"/>
+              </a:rPr>
+              <a:t>github.com</a:t>
+            </a:r>
+            <a:r>
+              <a:rPr lang="en-US" dirty="0">
+                <a:hlinkClick r:id="rId2"/>
+              </a:rPr>
+              <a:t>/Mollinetti/Statistics-R</a:t>
+            </a:r>
+            <a:endParaRPr lang="en-US" dirty="0" smtClean="0"/>
+          </a:p>
+          <a:p>
+            <a:r>
+              <a:rPr lang="en-US" dirty="0" smtClean="0"/>
+              <a:t>Download the script for this class! (in the </a:t>
+            </a:r>
+            <a:r>
+              <a:rPr lang="en-US" dirty="0"/>
+              <a:t>‘</a:t>
+            </a:r>
+            <a:r>
+              <a:rPr lang="en-US" dirty="0" smtClean="0"/>
+              <a:t>scripts’ folder class_2!)</a:t>
+            </a:r>
+            <a:endParaRPr lang="en-US" dirty="0"/>
+          </a:p>
+        </p:txBody>
+      </p:sp>
+    </p:spTree>
+    <p:extLst>
+      <p:ext uri="{BB962C8B-B14F-4D97-AF65-F5344CB8AC3E}">
+        <p14:creationId xmlns:p14="http://schemas.microsoft.com/office/powerpoint/2010/main" val="1051487484"/>
+      </p:ext>
+    </p:extLst>
+  </p:cSld>
+  <p:clrMapOvr>
+    <a:masterClrMapping/>
+  </p:clrMapOvr>
+  <p:transition spd="med"/>
+</p:sld>
+</file>
+
+<file path=ppt/slides/slide30.xml><?xml version="1.0" encoding="utf-8"?>
+<p:sld xmlns:a="http://schemas.openxmlformats.org/drawingml/2006/main" xmlns:r="http://schemas.openxmlformats.org/officeDocument/2006/relationships" xmlns:p="http://schemas.openxmlformats.org/presentationml/2006/main">
+  <p:cSld>
+    <p:spTree>
+      <p:nvGrpSpPr>
+        <p:cNvPr id="1" name=""/>
+        <p:cNvGrpSpPr/>
+        <p:nvPr/>
+      </p:nvGrpSpPr>
+      <p:grpSpPr>
+        <a:xfrm>
+          <a:off x="0" y="0"/>
+          <a:ext cx="0" cy="0"/>
+          <a:chOff x="0" y="0"/>
+          <a:chExt cx="0" cy="0"/>
+        </a:xfrm>
+      </p:grpSpPr>
+      <p:sp>
+        <p:nvSpPr>
+          <p:cNvPr id="2" name="Title 1"/>
+          <p:cNvSpPr>
+            <a:spLocks noGrp="1"/>
+          </p:cNvSpPr>
+          <p:nvPr>
+            <p:ph type="title"/>
+          </p:nvPr>
+        </p:nvSpPr>
+        <p:spPr/>
+        <p:txBody>
+          <a:bodyPr/>
+          <a:lstStyle/>
+          <a:p>
+            <a:r>
               <a:rPr lang="en-US" dirty="0"/>
               <a:t>Sampling Distributions</a:t>
             </a:r>
           </a:p>
         </p:txBody>
       </p:sp>
-      <mc:AlternateContent xmlns:mc="http://schemas.openxmlformats.org/markup-compatibility/2006">
-        <mc:Choice xmlns:a14="http://schemas.microsoft.com/office/drawing/2010/main" Requires="a14">
+      <mc:AlternateContent xmlns:mc="http://schemas.openxmlformats.org/markup-compatibility/2006" xmlns:a14="http://schemas.microsoft.com/office/drawing/2010/main">
+        <mc:Choice Requires="a14">
           <p:sp>
             <p:nvSpPr>
               <p:cNvPr id="3" name="Content Placeholder 2"/>
@@ -11188,7 +12164,7 @@
             </p:txBody>
           </p:sp>
         </mc:Choice>
-        <mc:Fallback>
+        <mc:Fallback xmlns="">
           <p:sp>
             <p:nvSpPr>
               <p:cNvPr id="3" name="Content Placeholder 2"/>
@@ -11222,8 +12198,8 @@
           </p:sp>
         </mc:Fallback>
       </mc:AlternateContent>
-      <mc:AlternateContent xmlns:mc="http://schemas.openxmlformats.org/markup-compatibility/2006">
-        <mc:Choice xmlns:a14="http://schemas.microsoft.com/office/drawing/2010/main" Requires="a14">
+      <mc:AlternateContent xmlns:mc="http://schemas.openxmlformats.org/markup-compatibility/2006" xmlns:a14="http://schemas.microsoft.com/office/drawing/2010/main">
+        <mc:Choice Requires="a14">
           <p:sp>
             <p:nvSpPr>
               <p:cNvPr id="5" name="TextBox 4"/>
@@ -11246,6 +12222,7 @@
               </a:bodyPr>
               <a:lstStyle/>
               <a:p>
+                <a:pPr/>
                 <a14:m>
                   <m:oMathPara xmlns:m="http://schemas.openxmlformats.org/officeDocument/2006/math">
                     <m:oMathParaPr>
@@ -11346,7 +12323,7 @@
             </p:txBody>
           </p:sp>
         </mc:Choice>
-        <mc:Fallback>
+        <mc:Fallback xmlns="">
           <p:sp>
             <p:nvSpPr>
               <p:cNvPr id="5" name="TextBox 4"/>
@@ -11396,10 +12373,17 @@
     <a:masterClrMapping/>
   </p:clrMapOvr>
   <p:transition spd="med"/>
+  <p:timing>
+    <p:tnLst>
+      <p:par>
+        <p:cTn id="1" dur="indefinite" restart="never" nodeType="tmRoot"/>
+      </p:par>
+    </p:tnLst>
+  </p:timing>
 </p:sld>
 </file>
 
-<file path=ppt/slides/slide27.xml><?xml version="1.0" encoding="utf-8"?>
+<file path=ppt/slides/slide31.xml><?xml version="1.0" encoding="utf-8"?>
 <p:sld xmlns:a="http://schemas.openxmlformats.org/drawingml/2006/main" xmlns:r="http://schemas.openxmlformats.org/officeDocument/2006/relationships" xmlns:p="http://schemas.openxmlformats.org/presentationml/2006/main">
   <p:cSld>
     <p:spTree>
@@ -11533,10 +12517,17 @@
     <a:masterClrMapping/>
   </p:clrMapOvr>
   <p:transition spd="med"/>
+  <p:timing>
+    <p:tnLst>
+      <p:par>
+        <p:cTn id="1" dur="indefinite" restart="never" nodeType="tmRoot"/>
+      </p:par>
+    </p:tnLst>
+  </p:timing>
 </p:sld>
 </file>
 
-<file path=ppt/slides/slide28.xml><?xml version="1.0" encoding="utf-8"?>
+<file path=ppt/slides/slide32.xml><?xml version="1.0" encoding="utf-8"?>
 <p:sld xmlns:a="http://schemas.openxmlformats.org/drawingml/2006/main" xmlns:r="http://schemas.openxmlformats.org/officeDocument/2006/relationships" xmlns:p="http://schemas.openxmlformats.org/presentationml/2006/main">
   <p:cSld>
     <p:spTree>
@@ -11645,10 +12636,17 @@
     <a:masterClrMapping/>
   </p:clrMapOvr>
   <p:transition spd="med"/>
+  <p:timing>
+    <p:tnLst>
+      <p:par>
+        <p:cTn id="1" dur="indefinite" restart="never" nodeType="tmRoot"/>
+      </p:par>
+    </p:tnLst>
+  </p:timing>
 </p:sld>
 </file>
 
-<file path=ppt/slides/slide29.xml><?xml version="1.0" encoding="utf-8"?>
+<file path=ppt/slides/slide33.xml><?xml version="1.0" encoding="utf-8"?>
 <p:sld xmlns:a="http://schemas.openxmlformats.org/drawingml/2006/main" xmlns:r="http://schemas.openxmlformats.org/officeDocument/2006/relationships" xmlns:p="http://schemas.openxmlformats.org/presentationml/2006/main">
   <p:cSld>
     <p:spTree>
@@ -11798,130 +12796,17 @@
     <a:masterClrMapping/>
   </p:clrMapOvr>
   <p:transition spd="med"/>
+  <p:timing>
+    <p:tnLst>
+      <p:par>
+        <p:cTn id="1" dur="indefinite" restart="never" nodeType="tmRoot"/>
+      </p:par>
+    </p:tnLst>
+  </p:timing>
 </p:sld>
 </file>
 
-<file path=ppt/slides/slide3.xml><?xml version="1.0" encoding="utf-8"?>
-<p:sld xmlns:a="http://schemas.openxmlformats.org/drawingml/2006/main" xmlns:r="http://schemas.openxmlformats.org/officeDocument/2006/relationships" xmlns:p="http://schemas.openxmlformats.org/presentationml/2006/main">
-  <p:cSld>
-    <p:spTree>
-      <p:nvGrpSpPr>
-        <p:cNvPr id="1" name=""/>
-        <p:cNvGrpSpPr/>
-        <p:nvPr/>
-      </p:nvGrpSpPr>
-      <p:grpSpPr>
-        <a:xfrm>
-          <a:off x="0" y="0"/>
-          <a:ext cx="0" cy="0"/>
-          <a:chOff x="0" y="0"/>
-          <a:chExt cx="0" cy="0"/>
-        </a:xfrm>
-      </p:grpSpPr>
-      <p:sp>
-        <p:nvSpPr>
-          <p:cNvPr id="2" name="Title 1"/>
-          <p:cNvSpPr>
-            <a:spLocks noGrp="1"/>
-          </p:cNvSpPr>
-          <p:nvPr>
-            <p:ph type="title"/>
-          </p:nvPr>
-        </p:nvSpPr>
-        <p:spPr/>
-        <p:txBody>
-          <a:bodyPr/>
-          <a:lstStyle/>
-          <a:p>
-            <a:endParaRPr lang="en-US" dirty="0"/>
-          </a:p>
-        </p:txBody>
-      </p:sp>
-      <p:sp>
-        <p:nvSpPr>
-          <p:cNvPr id="3" name="Content Placeholder 2"/>
-          <p:cNvSpPr>
-            <a:spLocks noGrp="1"/>
-          </p:cNvSpPr>
-          <p:nvPr>
-            <p:ph idx="1"/>
-          </p:nvPr>
-        </p:nvSpPr>
-        <p:spPr/>
-        <p:txBody>
-          <a:bodyPr/>
-          <a:lstStyle/>
-          <a:p>
-            <a:r>
-              <a:rPr lang="en-US" dirty="0" smtClean="0">
-                <a:solidFill>
-                  <a:srgbClr val="FF0000"/>
-                </a:solidFill>
-              </a:rPr>
-              <a:t>Data sets </a:t>
-            </a:r>
-            <a:r>
-              <a:rPr lang="mr-IN" dirty="0" smtClean="0">
-                <a:solidFill>
-                  <a:srgbClr val="FF0000"/>
-                </a:solidFill>
-              </a:rPr>
-              <a:t>–</a:t>
-            </a:r>
-            <a:r>
-              <a:rPr lang="en-US" dirty="0" smtClean="0">
-                <a:solidFill>
-                  <a:srgbClr val="FF0000"/>
-                </a:solidFill>
-              </a:rPr>
-              <a:t> recap</a:t>
-            </a:r>
-          </a:p>
-          <a:p>
-            <a:r>
-              <a:rPr lang="en-US" dirty="0"/>
-              <a:t>Categorical x </a:t>
-            </a:r>
-            <a:r>
-              <a:rPr lang="en-US" dirty="0" smtClean="0"/>
-              <a:t>Numerical</a:t>
-            </a:r>
-          </a:p>
-          <a:p>
-            <a:r>
-              <a:rPr lang="en-US" dirty="0" smtClean="0"/>
-              <a:t>Sampling Distributions </a:t>
-            </a:r>
-          </a:p>
-          <a:p>
-            <a:r>
-              <a:rPr lang="en-US" dirty="0" smtClean="0"/>
-              <a:t>Point estimators</a:t>
-            </a:r>
-          </a:p>
-          <a:p>
-            <a:endParaRPr lang="en-US" dirty="0" smtClean="0"/>
-          </a:p>
-          <a:p>
-            <a:endParaRPr lang="en-US" dirty="0"/>
-          </a:p>
-        </p:txBody>
-      </p:sp>
-    </p:spTree>
-    <p:extLst>
-      <p:ext uri="{BB962C8B-B14F-4D97-AF65-F5344CB8AC3E}">
-        <p14:creationId xmlns:p14="http://schemas.microsoft.com/office/powerpoint/2010/main" val="41085202"/>
-      </p:ext>
-    </p:extLst>
-  </p:cSld>
-  <p:clrMapOvr>
-    <a:masterClrMapping/>
-  </p:clrMapOvr>
-  <p:transition spd="med"/>
-</p:sld>
-</file>
-
-<file path=ppt/slides/slide30.xml><?xml version="1.0" encoding="utf-8"?>
+<file path=ppt/slides/slide34.xml><?xml version="1.0" encoding="utf-8"?>
 <p:sld xmlns:a="http://schemas.openxmlformats.org/drawingml/2006/main" xmlns:r="http://schemas.openxmlformats.org/officeDocument/2006/relationships" xmlns:p="http://schemas.openxmlformats.org/presentationml/2006/main">
   <p:cSld>
     <p:spTree>
@@ -12228,10 +13113,17 @@
     <a:masterClrMapping/>
   </p:clrMapOvr>
   <p:transition spd="med"/>
+  <p:timing>
+    <p:tnLst>
+      <p:par>
+        <p:cTn id="1" dur="indefinite" restart="never" nodeType="tmRoot"/>
+      </p:par>
+    </p:tnLst>
+  </p:timing>
 </p:sld>
 </file>
 
-<file path=ppt/slides/slide31.xml><?xml version="1.0" encoding="utf-8"?>
+<file path=ppt/slides/slide35.xml><?xml version="1.0" encoding="utf-8"?>
 <p:sld xmlns:a="http://schemas.openxmlformats.org/drawingml/2006/main" xmlns:r="http://schemas.openxmlformats.org/officeDocument/2006/relationships" xmlns:p="http://schemas.openxmlformats.org/presentationml/2006/main">
   <p:cSld>
     <p:spTree>
@@ -12376,10 +13268,17 @@
     <a:masterClrMapping/>
   </p:clrMapOvr>
   <p:transition spd="med"/>
+  <p:timing>
+    <p:tnLst>
+      <p:par>
+        <p:cTn id="1" dur="indefinite" restart="never" nodeType="tmRoot"/>
+      </p:par>
+    </p:tnLst>
+  </p:timing>
 </p:sld>
 </file>
 
-<file path=ppt/slides/slide32.xml><?xml version="1.0" encoding="utf-8"?>
+<file path=ppt/slides/slide36.xml><?xml version="1.0" encoding="utf-8"?>
 <p:sld xmlns:a="http://schemas.openxmlformats.org/drawingml/2006/main" xmlns:r="http://schemas.openxmlformats.org/officeDocument/2006/relationships" xmlns:p="http://schemas.openxmlformats.org/presentationml/2006/main">
   <p:cSld>
     <p:spTree>
@@ -12560,10 +13459,17 @@
     <a:masterClrMapping/>
   </p:clrMapOvr>
   <p:transition spd="med"/>
+  <p:timing>
+    <p:tnLst>
+      <p:par>
+        <p:cTn id="1" dur="indefinite" restart="never" nodeType="tmRoot"/>
+      </p:par>
+    </p:tnLst>
+  </p:timing>
 </p:sld>
 </file>
 
-<file path=ppt/slides/slide33.xml><?xml version="1.0" encoding="utf-8"?>
+<file path=ppt/slides/slide37.xml><?xml version="1.0" encoding="utf-8"?>
 <p:sld xmlns:a="http://schemas.openxmlformats.org/drawingml/2006/main" xmlns:r="http://schemas.openxmlformats.org/officeDocument/2006/relationships" xmlns:p="http://schemas.openxmlformats.org/presentationml/2006/main">
   <p:cSld>
     <p:spTree>
@@ -12835,6 +13741,133 @@
           <a:bodyPr/>
           <a:lstStyle/>
           <a:p>
+            <a:endParaRPr lang="en-US" dirty="0"/>
+          </a:p>
+        </p:txBody>
+      </p:sp>
+      <p:sp>
+        <p:nvSpPr>
+          <p:cNvPr id="3" name="Content Placeholder 2"/>
+          <p:cNvSpPr>
+            <a:spLocks noGrp="1"/>
+          </p:cNvSpPr>
+          <p:nvPr>
+            <p:ph idx="1"/>
+          </p:nvPr>
+        </p:nvSpPr>
+        <p:spPr/>
+        <p:txBody>
+          <a:bodyPr/>
+          <a:lstStyle/>
+          <a:p>
+            <a:r>
+              <a:rPr lang="en-US" dirty="0" smtClean="0">
+                <a:solidFill>
+                  <a:srgbClr val="FF0000"/>
+                </a:solidFill>
+              </a:rPr>
+              <a:t>Data sets </a:t>
+            </a:r>
+            <a:r>
+              <a:rPr lang="mr-IN" dirty="0" smtClean="0">
+                <a:solidFill>
+                  <a:srgbClr val="FF0000"/>
+                </a:solidFill>
+              </a:rPr>
+              <a:t>–</a:t>
+            </a:r>
+            <a:r>
+              <a:rPr lang="en-US" dirty="0" smtClean="0">
+                <a:solidFill>
+                  <a:srgbClr val="FF0000"/>
+                </a:solidFill>
+              </a:rPr>
+              <a:t> recap</a:t>
+            </a:r>
+          </a:p>
+          <a:p>
+            <a:r>
+              <a:rPr lang="en-US" dirty="0"/>
+              <a:t>Categorical x </a:t>
+            </a:r>
+            <a:r>
+              <a:rPr lang="en-US" dirty="0" smtClean="0"/>
+              <a:t>Numerical</a:t>
+            </a:r>
+          </a:p>
+          <a:p>
+            <a:r>
+              <a:rPr lang="en-US" dirty="0" smtClean="0"/>
+              <a:t>Sampling Distributions </a:t>
+            </a:r>
+          </a:p>
+          <a:p>
+            <a:r>
+              <a:rPr lang="en-US" dirty="0" smtClean="0"/>
+              <a:t>Point estimators</a:t>
+            </a:r>
+          </a:p>
+          <a:p>
+            <a:endParaRPr lang="en-US" dirty="0" smtClean="0"/>
+          </a:p>
+          <a:p>
+            <a:endParaRPr lang="en-US" dirty="0"/>
+          </a:p>
+        </p:txBody>
+      </p:sp>
+    </p:spTree>
+    <p:extLst>
+      <p:ext uri="{BB962C8B-B14F-4D97-AF65-F5344CB8AC3E}">
+        <p14:creationId xmlns:p14="http://schemas.microsoft.com/office/powerpoint/2010/main" val="41085202"/>
+      </p:ext>
+    </p:extLst>
+  </p:cSld>
+  <p:clrMapOvr>
+    <a:masterClrMapping/>
+  </p:clrMapOvr>
+  <p:transition spd="med"/>
+  <p:timing>
+    <p:tnLst>
+      <p:par>
+        <p:cTn id="1" dur="indefinite" restart="never" nodeType="tmRoot"/>
+      </p:par>
+    </p:tnLst>
+  </p:timing>
+</p:sld>
+</file>
+
+<file path=ppt/slides/slide5.xml><?xml version="1.0" encoding="utf-8"?>
+<p:sld xmlns:a="http://schemas.openxmlformats.org/drawingml/2006/main" xmlns:r="http://schemas.openxmlformats.org/officeDocument/2006/relationships" xmlns:p="http://schemas.openxmlformats.org/presentationml/2006/main">
+  <p:cSld>
+    <p:spTree>
+      <p:nvGrpSpPr>
+        <p:cNvPr id="1" name=""/>
+        <p:cNvGrpSpPr/>
+        <p:nvPr/>
+      </p:nvGrpSpPr>
+      <p:grpSpPr>
+        <a:xfrm>
+          <a:off x="0" y="0"/>
+          <a:ext cx="0" cy="0"/>
+          <a:chOff x="0" y="0"/>
+          <a:chExt cx="0" cy="0"/>
+        </a:xfrm>
+      </p:grpSpPr>
+      <p:sp>
+        <p:nvSpPr>
+          <p:cNvPr id="2" name="Title 1"/>
+          <p:cNvSpPr>
+            <a:spLocks noGrp="1"/>
+          </p:cNvSpPr>
+          <p:nvPr>
+            <p:ph type="title"/>
+          </p:nvPr>
+        </p:nvSpPr>
+        <p:spPr/>
+        <p:txBody>
+          <a:bodyPr/>
+          <a:lstStyle/>
+          <a:p>
             <a:r>
               <a:rPr lang="en-US" dirty="0" smtClean="0"/>
               <a:t>Data sets - Recap</a:t>
@@ -12911,10 +13944,17 @@
     <a:masterClrMapping/>
   </p:clrMapOvr>
   <p:transition spd="med"/>
+  <p:timing>
+    <p:tnLst>
+      <p:par>
+        <p:cTn id="1" dur="indefinite" restart="never" nodeType="tmRoot"/>
+      </p:par>
+    </p:tnLst>
+  </p:timing>
 </p:sld>
 </file>
 
-<file path=ppt/slides/slide5.xml><?xml version="1.0" encoding="utf-8"?>
+<file path=ppt/slides/slide6.xml><?xml version="1.0" encoding="utf-8"?>
 <p:sld xmlns:a="http://schemas.openxmlformats.org/drawingml/2006/main" xmlns:r="http://schemas.openxmlformats.org/officeDocument/2006/relationships" xmlns:p="http://schemas.openxmlformats.org/presentationml/2006/main">
   <p:cSld>
     <p:spTree>
@@ -13120,10 +14160,17 @@
     <a:masterClrMapping/>
   </p:clrMapOvr>
   <p:transition spd="med"/>
+  <p:timing>
+    <p:tnLst>
+      <p:par>
+        <p:cTn id="1" dur="indefinite" restart="never" nodeType="tmRoot"/>
+      </p:par>
+    </p:tnLst>
+  </p:timing>
 </p:sld>
 </file>
 
-<file path=ppt/slides/slide6.xml><?xml version="1.0" encoding="utf-8"?>
+<file path=ppt/slides/slide7.xml><?xml version="1.0" encoding="utf-8"?>
 <p:sld xmlns:a="http://schemas.openxmlformats.org/drawingml/2006/main" xmlns:r="http://schemas.openxmlformats.org/officeDocument/2006/relationships" xmlns:p="http://schemas.openxmlformats.org/presentationml/2006/main">
   <p:cSld>
     <p:spTree>
@@ -13226,10 +14273,17 @@
     <a:masterClrMapping/>
   </p:clrMapOvr>
   <p:transition spd="med"/>
+  <p:timing>
+    <p:tnLst>
+      <p:par>
+        <p:cTn id="1" dur="indefinite" restart="never" nodeType="tmRoot"/>
+      </p:par>
+    </p:tnLst>
+  </p:timing>
 </p:sld>
 </file>
 
-<file path=ppt/slides/slide7.xml><?xml version="1.0" encoding="utf-8"?>
+<file path=ppt/slides/slide8.xml><?xml version="1.0" encoding="utf-8"?>
 <p:sld xmlns:a="http://schemas.openxmlformats.org/drawingml/2006/main" xmlns:r="http://schemas.openxmlformats.org/officeDocument/2006/relationships" xmlns:p="http://schemas.openxmlformats.org/presentationml/2006/main">
   <p:cSld>
     <p:spTree>
@@ -13392,10 +14446,17 @@
     <a:masterClrMapping/>
   </p:clrMapOvr>
   <p:transition spd="med"/>
+  <p:timing>
+    <p:tnLst>
+      <p:par>
+        <p:cTn id="1" dur="indefinite" restart="never" nodeType="tmRoot"/>
+      </p:par>
+    </p:tnLst>
+  </p:timing>
 </p:sld>
 </file>
 
-<file path=ppt/slides/slide8.xml><?xml version="1.0" encoding="utf-8"?>
+<file path=ppt/slides/slide9.xml><?xml version="1.0" encoding="utf-8"?>
 <p:sld xmlns:a="http://schemas.openxmlformats.org/drawingml/2006/main" xmlns:r="http://schemas.openxmlformats.org/officeDocument/2006/relationships" xmlns:p="http://schemas.openxmlformats.org/presentationml/2006/main">
   <p:cSld>
     <p:spTree>
@@ -13504,148 +14565,13 @@
     <a:masterClrMapping/>
   </p:clrMapOvr>
   <p:transition spd="med"/>
-</p:sld>
-</file>
-
-<file path=ppt/slides/slide9.xml><?xml version="1.0" encoding="utf-8"?>
-<p:sld xmlns:a="http://schemas.openxmlformats.org/drawingml/2006/main" xmlns:r="http://schemas.openxmlformats.org/officeDocument/2006/relationships" xmlns:p="http://schemas.openxmlformats.org/presentationml/2006/main">
-  <p:cSld>
-    <p:spTree>
-      <p:nvGrpSpPr>
-        <p:cNvPr id="1" name=""/>
-        <p:cNvGrpSpPr/>
-        <p:nvPr/>
-      </p:nvGrpSpPr>
-      <p:grpSpPr>
-        <a:xfrm>
-          <a:off x="0" y="0"/>
-          <a:ext cx="0" cy="0"/>
-          <a:chOff x="0" y="0"/>
-          <a:chExt cx="0" cy="0"/>
-        </a:xfrm>
-      </p:grpSpPr>
-      <p:sp>
-        <p:nvSpPr>
-          <p:cNvPr id="2" name="Title 1"/>
-          <p:cNvSpPr>
-            <a:spLocks noGrp="1"/>
-          </p:cNvSpPr>
-          <p:nvPr>
-            <p:ph type="title"/>
-          </p:nvPr>
-        </p:nvSpPr>
-        <p:spPr/>
-        <p:txBody>
-          <a:bodyPr/>
-          <a:lstStyle/>
-          <a:p>
-            <a:r>
-              <a:rPr lang="en-US" dirty="0"/>
-              <a:t>Data sets - Recap</a:t>
-            </a:r>
-          </a:p>
-        </p:txBody>
-      </p:sp>
-      <p:pic>
-        <p:nvPicPr>
-          <p:cNvPr id="4" name="Content Placeholder 3"/>
-          <p:cNvPicPr>
-            <a:picLocks noGrp="1" noChangeAspect="1"/>
-          </p:cNvPicPr>
-          <p:nvPr>
-            <p:ph idx="1"/>
-          </p:nvPr>
-        </p:nvPicPr>
-        <p:blipFill>
-          <a:blip r:embed="rId2">
-            <a:extLst>
-              <a:ext uri="{28A0092B-C50C-407E-A947-70E740481C1C}">
-                <a14:useLocalDpi xmlns:a14="http://schemas.microsoft.com/office/drawing/2010/main" val="0"/>
-              </a:ext>
-            </a:extLst>
-          </a:blip>
-          <a:stretch>
-            <a:fillRect/>
-          </a:stretch>
-        </p:blipFill>
-        <p:spPr>
-          <a:xfrm>
-            <a:off x="560512" y="1988840"/>
-            <a:ext cx="8915400" cy="1924421"/>
-          </a:xfrm>
-        </p:spPr>
-      </p:pic>
-      <p:pic>
-        <p:nvPicPr>
-          <p:cNvPr id="5" name="Picture 4"/>
-          <p:cNvPicPr>
-            <a:picLocks noChangeAspect="1"/>
-          </p:cNvPicPr>
-          <p:nvPr/>
-        </p:nvPicPr>
-        <p:blipFill>
-          <a:blip r:embed="rId3">
-            <a:extLst>
-              <a:ext uri="{28A0092B-C50C-407E-A947-70E740481C1C}">
-                <a14:useLocalDpi xmlns:a14="http://schemas.microsoft.com/office/drawing/2010/main" val="0"/>
-              </a:ext>
-            </a:extLst>
-          </a:blip>
-          <a:stretch>
-            <a:fillRect/>
-          </a:stretch>
-        </p:blipFill>
-        <p:spPr>
-          <a:xfrm>
-            <a:off x="560512" y="4092626"/>
-            <a:ext cx="1587500" cy="495300"/>
-          </a:xfrm>
-          <a:prstGeom prst="rect">
-            <a:avLst/>
-          </a:prstGeom>
-        </p:spPr>
-      </p:pic>
-      <p:pic>
-        <p:nvPicPr>
-          <p:cNvPr id="6" name="Picture 5"/>
-          <p:cNvPicPr>
-            <a:picLocks noChangeAspect="1"/>
-          </p:cNvPicPr>
-          <p:nvPr/>
-        </p:nvPicPr>
-        <p:blipFill>
-          <a:blip r:embed="rId4">
-            <a:extLst>
-              <a:ext uri="{28A0092B-C50C-407E-A947-70E740481C1C}">
-                <a14:useLocalDpi xmlns:a14="http://schemas.microsoft.com/office/drawing/2010/main" val="0"/>
-              </a:ext>
-            </a:extLst>
-          </a:blip>
-          <a:stretch>
-            <a:fillRect/>
-          </a:stretch>
-        </p:blipFill>
-        <p:spPr>
-          <a:xfrm>
-            <a:off x="564526" y="4767291"/>
-            <a:ext cx="7264400" cy="1778000"/>
-          </a:xfrm>
-          <a:prstGeom prst="rect">
-            <a:avLst/>
-          </a:prstGeom>
-        </p:spPr>
-      </p:pic>
-    </p:spTree>
-    <p:extLst>
-      <p:ext uri="{BB962C8B-B14F-4D97-AF65-F5344CB8AC3E}">
-        <p14:creationId xmlns:p14="http://schemas.microsoft.com/office/powerpoint/2010/main" val="1495662573"/>
-      </p:ext>
-    </p:extLst>
-  </p:cSld>
-  <p:clrMapOvr>
-    <a:masterClrMapping/>
-  </p:clrMapOvr>
-  <p:transition spd="med"/>
+  <p:timing>
+    <p:tnLst>
+      <p:par>
+        <p:cTn id="1" dur="indefinite" restart="never" nodeType="tmRoot"/>
+      </p:par>
+    </p:tnLst>
+  </p:timing>
 </p:sld>
 </file>
 

</xml_diff>